<commit_message>
finished bredth first search
</commit_message>
<xml_diff>
--- a/hw1_images.pptx
+++ b/hw1_images.pptx
@@ -6,6 +6,7 @@
   </p:sldMasterIdLst>
   <p:sldIdLst>
     <p:sldId id="256" r:id="rId2"/>
+    <p:sldId id="257" r:id="rId3"/>
   </p:sldIdLst>
   <p:sldSz cx="12192000" cy="6858000"/>
   <p:notesSz cx="6858000" cy="9144000"/>
@@ -3410,7 +3411,7 @@
           <p:nvPr>
             <p:extLst>
               <p:ext uri="{D42A27DB-BD31-4B8C-83A1-F6EECF244321}">
-                <p14:modId xmlns:p14="http://schemas.microsoft.com/office/powerpoint/2010/main" val="4235781449"/>
+                <p14:modId xmlns:p14="http://schemas.microsoft.com/office/powerpoint/2010/main" val="184285282"/>
               </p:ext>
             </p:extLst>
           </p:nvPr>
@@ -5639,7 +5640,7 @@
           <p:nvPr>
             <p:extLst>
               <p:ext uri="{D42A27DB-BD31-4B8C-83A1-F6EECF244321}">
-                <p14:modId xmlns:p14="http://schemas.microsoft.com/office/powerpoint/2010/main" val="1088352675"/>
+                <p14:modId xmlns:p14="http://schemas.microsoft.com/office/powerpoint/2010/main" val="2958327428"/>
               </p:ext>
             </p:extLst>
           </p:nvPr>
@@ -8448,7 +8449,7 @@
           <p:nvPr>
             <p:extLst>
               <p:ext uri="{D42A27DB-BD31-4B8C-83A1-F6EECF244321}">
-                <p14:modId xmlns:p14="http://schemas.microsoft.com/office/powerpoint/2010/main" val="2406587499"/>
+                <p14:modId xmlns:p14="http://schemas.microsoft.com/office/powerpoint/2010/main" val="1846515124"/>
               </p:ext>
             </p:extLst>
           </p:nvPr>
@@ -10959,6 +10960,791 @@
 </p:sld>
 </file>
 
+<file path=ppt/slides/slide2.xml><?xml version="1.0" encoding="utf-8"?>
+<p:sld xmlns:a="http://schemas.openxmlformats.org/drawingml/2006/main" xmlns:r="http://schemas.openxmlformats.org/officeDocument/2006/relationships" xmlns:p="http://schemas.openxmlformats.org/presentationml/2006/main">
+  <p:cSld>
+    <p:spTree>
+      <p:nvGrpSpPr>
+        <p:cNvPr id="1" name=""/>
+        <p:cNvGrpSpPr/>
+        <p:nvPr/>
+      </p:nvGrpSpPr>
+      <p:grpSpPr>
+        <a:xfrm>
+          <a:off x="0" y="0"/>
+          <a:ext cx="0" cy="0"/>
+          <a:chOff x="0" y="0"/>
+          <a:chExt cx="0" cy="0"/>
+        </a:xfrm>
+      </p:grpSpPr>
+      <p:graphicFrame>
+        <p:nvGraphicFramePr>
+          <p:cNvPr id="4" name="Table 5">
+            <a:extLst>
+              <a:ext uri="{FF2B5EF4-FFF2-40B4-BE49-F238E27FC236}">
+                <a16:creationId xmlns:a16="http://schemas.microsoft.com/office/drawing/2014/main" id="{261DDF55-2805-4C08-8A59-76AFCA38F702}"/>
+              </a:ext>
+            </a:extLst>
+          </p:cNvPr>
+          <p:cNvGraphicFramePr>
+            <a:graphicFrameLocks noGrp="1"/>
+          </p:cNvGraphicFramePr>
+          <p:nvPr>
+            <p:extLst>
+              <p:ext uri="{D42A27DB-BD31-4B8C-83A1-F6EECF244321}">
+                <p14:modId xmlns:p14="http://schemas.microsoft.com/office/powerpoint/2010/main" val="1287289975"/>
+              </p:ext>
+            </p:extLst>
+          </p:nvPr>
+        </p:nvGraphicFramePr>
+        <p:xfrm>
+          <a:off x="10872655" y="464343"/>
+          <a:ext cx="825860" cy="439782"/>
+        </p:xfrm>
+        <a:graphic>
+          <a:graphicData uri="http://schemas.openxmlformats.org/drawingml/2006/table">
+            <a:tbl>
+              <a:tblPr rtl="1" firstRow="1" bandRow="1">
+                <a:tableStyleId>{5C22544A-7EE6-4342-B048-85BDC9FD1C3A}</a:tableStyleId>
+              </a:tblPr>
+              <a:tblGrid>
+                <a:gridCol w="165172">
+                  <a:extLst>
+                    <a:ext uri="{9D8B030D-6E8A-4147-A177-3AD203B41FA5}">
+                      <a16:colId xmlns:a16="http://schemas.microsoft.com/office/drawing/2014/main" val="1545461720"/>
+                    </a:ext>
+                  </a:extLst>
+                </a:gridCol>
+                <a:gridCol w="165172">
+                  <a:extLst>
+                    <a:ext uri="{9D8B030D-6E8A-4147-A177-3AD203B41FA5}">
+                      <a16:colId xmlns:a16="http://schemas.microsoft.com/office/drawing/2014/main" val="1569400049"/>
+                    </a:ext>
+                  </a:extLst>
+                </a:gridCol>
+                <a:gridCol w="165172">
+                  <a:extLst>
+                    <a:ext uri="{9D8B030D-6E8A-4147-A177-3AD203B41FA5}">
+                      <a16:colId xmlns:a16="http://schemas.microsoft.com/office/drawing/2014/main" val="929146903"/>
+                    </a:ext>
+                  </a:extLst>
+                </a:gridCol>
+                <a:gridCol w="165172">
+                  <a:extLst>
+                    <a:ext uri="{9D8B030D-6E8A-4147-A177-3AD203B41FA5}">
+                      <a16:colId xmlns:a16="http://schemas.microsoft.com/office/drawing/2014/main" val="1205294750"/>
+                    </a:ext>
+                  </a:extLst>
+                </a:gridCol>
+                <a:gridCol w="165172">
+                  <a:extLst>
+                    <a:ext uri="{9D8B030D-6E8A-4147-A177-3AD203B41FA5}">
+                      <a16:colId xmlns:a16="http://schemas.microsoft.com/office/drawing/2014/main" val="2519948292"/>
+                    </a:ext>
+                  </a:extLst>
+                </a:gridCol>
+              </a:tblGrid>
+              <a:tr h="219891">
+                <a:tc>
+                  <a:txBody>
+                    <a:bodyPr/>
+                    <a:lstStyle/>
+                    <a:p>
+                      <a:pPr algn="ctr" rtl="0"/>
+                      <a:r>
+                        <a:rPr lang="en-US" sz="1400" b="0" dirty="0">
+                          <a:solidFill>
+                            <a:schemeClr val="tx1">
+                              <a:alpha val="50000"/>
+                            </a:schemeClr>
+                          </a:solidFill>
+                          <a:latin typeface="David" panose="020E0502060401010101" pitchFamily="34" charset="-79"/>
+                          <a:cs typeface="David" panose="020E0502060401010101" pitchFamily="34" charset="-79"/>
+                        </a:rPr>
+                        <a:t>3</a:t>
+                      </a:r>
+                      <a:endParaRPr lang="he-IL" sz="1400" b="0" dirty="0">
+                        <a:solidFill>
+                          <a:schemeClr val="tx1">
+                            <a:alpha val="50000"/>
+                          </a:schemeClr>
+                        </a:solidFill>
+                        <a:latin typeface="David" panose="020E0502060401010101" pitchFamily="34" charset="-79"/>
+                        <a:cs typeface="David" panose="020E0502060401010101" pitchFamily="34" charset="-79"/>
+                      </a:endParaRPr>
+                    </a:p>
+                  </a:txBody>
+                  <a:tcPr marL="0" marR="0" marT="0" marB="0" anchor="ctr">
+                    <a:lnL w="12700" cap="flat" cmpd="sng" algn="ctr">
+                      <a:noFill/>
+                      <a:prstDash val="solid"/>
+                      <a:round/>
+                      <a:headEnd type="none" w="med" len="med"/>
+                      <a:tailEnd type="none" w="med" len="med"/>
+                    </a:lnL>
+                    <a:lnR w="12700" cap="flat" cmpd="sng" algn="ctr">
+                      <a:noFill/>
+                      <a:prstDash val="solid"/>
+                      <a:round/>
+                      <a:headEnd type="none" w="med" len="med"/>
+                      <a:tailEnd type="none" w="med" len="med"/>
+                    </a:lnR>
+                    <a:lnT w="12700" cap="flat" cmpd="sng" algn="ctr">
+                      <a:noFill/>
+                      <a:prstDash val="solid"/>
+                      <a:round/>
+                      <a:headEnd type="none" w="med" len="med"/>
+                      <a:tailEnd type="none" w="med" len="med"/>
+                    </a:lnT>
+                    <a:lnB w="12700" cap="flat" cmpd="sng" algn="ctr">
+                      <a:solidFill>
+                        <a:schemeClr val="tx1"/>
+                      </a:solidFill>
+                      <a:prstDash val="solid"/>
+                      <a:round/>
+                      <a:headEnd type="none" w="med" len="med"/>
+                      <a:tailEnd type="none" w="med" len="med"/>
+                    </a:lnB>
+                    <a:lnTlToBr w="12700" cmpd="sng">
+                      <a:noFill/>
+                      <a:prstDash val="solid"/>
+                    </a:lnTlToBr>
+                    <a:lnBlToTr w="12700" cmpd="sng">
+                      <a:noFill/>
+                      <a:prstDash val="solid"/>
+                    </a:lnBlToTr>
+                    <a:noFill/>
+                  </a:tcPr>
+                </a:tc>
+                <a:tc>
+                  <a:txBody>
+                    <a:bodyPr/>
+                    <a:lstStyle/>
+                    <a:p>
+                      <a:pPr algn="ctr" rtl="0"/>
+                      <a:r>
+                        <a:rPr lang="en-US" sz="1400" b="0" dirty="0">
+                          <a:solidFill>
+                            <a:schemeClr val="tx1">
+                              <a:alpha val="50000"/>
+                            </a:schemeClr>
+                          </a:solidFill>
+                          <a:latin typeface="David" panose="020E0502060401010101" pitchFamily="34" charset="-79"/>
+                          <a:cs typeface="David" panose="020E0502060401010101" pitchFamily="34" charset="-79"/>
+                        </a:rPr>
+                        <a:t>2</a:t>
+                      </a:r>
+                      <a:endParaRPr lang="he-IL" sz="1400" b="0" dirty="0">
+                        <a:solidFill>
+                          <a:schemeClr val="tx1">
+                            <a:alpha val="50000"/>
+                          </a:schemeClr>
+                        </a:solidFill>
+                        <a:latin typeface="David" panose="020E0502060401010101" pitchFamily="34" charset="-79"/>
+                        <a:cs typeface="David" panose="020E0502060401010101" pitchFamily="34" charset="-79"/>
+                      </a:endParaRPr>
+                    </a:p>
+                  </a:txBody>
+                  <a:tcPr marL="0" marR="0" marT="0" marB="0" anchor="ctr">
+                    <a:lnL w="12700" cap="flat" cmpd="sng" algn="ctr">
+                      <a:noFill/>
+                      <a:prstDash val="solid"/>
+                      <a:round/>
+                      <a:headEnd type="none" w="med" len="med"/>
+                      <a:tailEnd type="none" w="med" len="med"/>
+                    </a:lnL>
+                    <a:lnR w="12700" cap="flat" cmpd="sng" algn="ctr">
+                      <a:noFill/>
+                      <a:prstDash val="solid"/>
+                      <a:round/>
+                      <a:headEnd type="none" w="med" len="med"/>
+                      <a:tailEnd type="none" w="med" len="med"/>
+                    </a:lnR>
+                    <a:lnT w="12700" cap="flat" cmpd="sng" algn="ctr">
+                      <a:noFill/>
+                      <a:prstDash val="solid"/>
+                      <a:round/>
+                      <a:headEnd type="none" w="med" len="med"/>
+                      <a:tailEnd type="none" w="med" len="med"/>
+                    </a:lnT>
+                    <a:lnB w="12700" cap="flat" cmpd="sng" algn="ctr">
+                      <a:solidFill>
+                        <a:schemeClr val="tx1"/>
+                      </a:solidFill>
+                      <a:prstDash val="solid"/>
+                      <a:round/>
+                      <a:headEnd type="none" w="med" len="med"/>
+                      <a:tailEnd type="none" w="med" len="med"/>
+                    </a:lnB>
+                    <a:lnTlToBr w="12700" cmpd="sng">
+                      <a:noFill/>
+                      <a:prstDash val="solid"/>
+                    </a:lnTlToBr>
+                    <a:lnBlToTr w="12700" cmpd="sng">
+                      <a:noFill/>
+                      <a:prstDash val="solid"/>
+                    </a:lnBlToTr>
+                    <a:noFill/>
+                  </a:tcPr>
+                </a:tc>
+                <a:tc>
+                  <a:txBody>
+                    <a:bodyPr/>
+                    <a:lstStyle/>
+                    <a:p>
+                      <a:pPr algn="ctr" rtl="0"/>
+                      <a:r>
+                        <a:rPr lang="en-US" sz="1400" b="0" dirty="0">
+                          <a:solidFill>
+                            <a:schemeClr val="tx1">
+                              <a:alpha val="50000"/>
+                            </a:schemeClr>
+                          </a:solidFill>
+                          <a:latin typeface="David" panose="020E0502060401010101" pitchFamily="34" charset="-79"/>
+                          <a:cs typeface="David" panose="020E0502060401010101" pitchFamily="34" charset="-79"/>
+                        </a:rPr>
+                        <a:t>1</a:t>
+                      </a:r>
+                      <a:endParaRPr lang="he-IL" sz="1400" b="0" dirty="0">
+                        <a:solidFill>
+                          <a:schemeClr val="tx1">
+                            <a:alpha val="50000"/>
+                          </a:schemeClr>
+                        </a:solidFill>
+                        <a:latin typeface="David" panose="020E0502060401010101" pitchFamily="34" charset="-79"/>
+                        <a:cs typeface="David" panose="020E0502060401010101" pitchFamily="34" charset="-79"/>
+                      </a:endParaRPr>
+                    </a:p>
+                  </a:txBody>
+                  <a:tcPr marL="0" marR="0" marT="0" marB="0" anchor="ctr">
+                    <a:lnL w="12700" cap="flat" cmpd="sng" algn="ctr">
+                      <a:noFill/>
+                      <a:prstDash val="solid"/>
+                      <a:round/>
+                      <a:headEnd type="none" w="med" len="med"/>
+                      <a:tailEnd type="none" w="med" len="med"/>
+                    </a:lnL>
+                    <a:lnR w="12700" cap="flat" cmpd="sng" algn="ctr">
+                      <a:noFill/>
+                      <a:prstDash val="solid"/>
+                      <a:round/>
+                      <a:headEnd type="none" w="med" len="med"/>
+                      <a:tailEnd type="none" w="med" len="med"/>
+                    </a:lnR>
+                    <a:lnT w="12700" cap="flat" cmpd="sng" algn="ctr">
+                      <a:noFill/>
+                      <a:prstDash val="solid"/>
+                      <a:round/>
+                      <a:headEnd type="none" w="med" len="med"/>
+                      <a:tailEnd type="none" w="med" len="med"/>
+                    </a:lnT>
+                    <a:lnB w="12700" cap="flat" cmpd="sng" algn="ctr">
+                      <a:solidFill>
+                        <a:schemeClr val="tx1"/>
+                      </a:solidFill>
+                      <a:prstDash val="solid"/>
+                      <a:round/>
+                      <a:headEnd type="none" w="med" len="med"/>
+                      <a:tailEnd type="none" w="med" len="med"/>
+                    </a:lnB>
+                    <a:lnTlToBr w="12700" cmpd="sng">
+                      <a:noFill/>
+                      <a:prstDash val="solid"/>
+                    </a:lnTlToBr>
+                    <a:lnBlToTr w="12700" cmpd="sng">
+                      <a:noFill/>
+                      <a:prstDash val="solid"/>
+                    </a:lnBlToTr>
+                    <a:noFill/>
+                  </a:tcPr>
+                </a:tc>
+                <a:tc>
+                  <a:txBody>
+                    <a:bodyPr/>
+                    <a:lstStyle/>
+                    <a:p>
+                      <a:pPr algn="ctr" rtl="0"/>
+                      <a:r>
+                        <a:rPr lang="en-US" sz="1400" b="0" dirty="0">
+                          <a:solidFill>
+                            <a:schemeClr val="tx1">
+                              <a:alpha val="50000"/>
+                            </a:schemeClr>
+                          </a:solidFill>
+                          <a:latin typeface="David" panose="020E0502060401010101" pitchFamily="34" charset="-79"/>
+                          <a:cs typeface="David" panose="020E0502060401010101" pitchFamily="34" charset="-79"/>
+                        </a:rPr>
+                        <a:t>0</a:t>
+                      </a:r>
+                      <a:endParaRPr lang="he-IL" sz="1400" b="0" dirty="0">
+                        <a:solidFill>
+                          <a:schemeClr val="tx1">
+                            <a:alpha val="50000"/>
+                          </a:schemeClr>
+                        </a:solidFill>
+                        <a:latin typeface="David" panose="020E0502060401010101" pitchFamily="34" charset="-79"/>
+                        <a:cs typeface="David" panose="020E0502060401010101" pitchFamily="34" charset="-79"/>
+                      </a:endParaRPr>
+                    </a:p>
+                  </a:txBody>
+                  <a:tcPr marL="0" marR="0" marT="0" marB="0" anchor="ctr">
+                    <a:lnL w="12700" cap="flat" cmpd="sng" algn="ctr">
+                      <a:noFill/>
+                      <a:prstDash val="solid"/>
+                      <a:round/>
+                      <a:headEnd type="none" w="med" len="med"/>
+                      <a:tailEnd type="none" w="med" len="med"/>
+                    </a:lnL>
+                    <a:lnR w="12700" cap="flat" cmpd="sng" algn="ctr">
+                      <a:noFill/>
+                      <a:prstDash val="solid"/>
+                      <a:round/>
+                      <a:headEnd type="none" w="med" len="med"/>
+                      <a:tailEnd type="none" w="med" len="med"/>
+                    </a:lnR>
+                    <a:lnT w="12700" cap="flat" cmpd="sng" algn="ctr">
+                      <a:noFill/>
+                      <a:prstDash val="solid"/>
+                      <a:round/>
+                      <a:headEnd type="none" w="med" len="med"/>
+                      <a:tailEnd type="none" w="med" len="med"/>
+                    </a:lnT>
+                    <a:lnB w="12700" cap="flat" cmpd="sng" algn="ctr">
+                      <a:solidFill>
+                        <a:schemeClr val="tx1"/>
+                      </a:solidFill>
+                      <a:prstDash val="solid"/>
+                      <a:round/>
+                      <a:headEnd type="none" w="med" len="med"/>
+                      <a:tailEnd type="none" w="med" len="med"/>
+                    </a:lnB>
+                    <a:lnTlToBr w="12700" cmpd="sng">
+                      <a:noFill/>
+                      <a:prstDash val="solid"/>
+                    </a:lnTlToBr>
+                    <a:lnBlToTr w="12700" cmpd="sng">
+                      <a:noFill/>
+                      <a:prstDash val="solid"/>
+                    </a:lnBlToTr>
+                    <a:noFill/>
+                  </a:tcPr>
+                </a:tc>
+                <a:tc>
+                  <a:txBody>
+                    <a:bodyPr/>
+                    <a:lstStyle/>
+                    <a:p>
+                      <a:pPr algn="ctr" rtl="0"/>
+                      <a:endParaRPr lang="he-IL" sz="1400" b="0" dirty="0">
+                        <a:solidFill>
+                          <a:schemeClr val="tx1"/>
+                        </a:solidFill>
+                        <a:latin typeface="David" panose="020E0502060401010101" pitchFamily="34" charset="-79"/>
+                        <a:cs typeface="David" panose="020E0502060401010101" pitchFamily="34" charset="-79"/>
+                      </a:endParaRPr>
+                    </a:p>
+                  </a:txBody>
+                  <a:tcPr marL="0" marR="0" marT="0" marB="0" anchor="ctr">
+                    <a:lnL w="12700" cap="flat" cmpd="sng" algn="ctr">
+                      <a:noFill/>
+                      <a:prstDash val="solid"/>
+                      <a:round/>
+                      <a:headEnd type="none" w="med" len="med"/>
+                      <a:tailEnd type="none" w="med" len="med"/>
+                    </a:lnL>
+                    <a:lnR w="12700" cap="flat" cmpd="sng" algn="ctr">
+                      <a:noFill/>
+                      <a:prstDash val="solid"/>
+                      <a:round/>
+                      <a:headEnd type="none" w="med" len="med"/>
+                      <a:tailEnd type="none" w="med" len="med"/>
+                    </a:lnR>
+                    <a:lnT w="12700" cap="flat" cmpd="sng" algn="ctr">
+                      <a:noFill/>
+                      <a:prstDash val="solid"/>
+                      <a:round/>
+                      <a:headEnd type="none" w="med" len="med"/>
+                      <a:tailEnd type="none" w="med" len="med"/>
+                    </a:lnT>
+                    <a:lnB w="12700" cap="flat" cmpd="sng" algn="ctr">
+                      <a:noFill/>
+                      <a:prstDash val="solid"/>
+                      <a:round/>
+                      <a:headEnd type="none" w="med" len="med"/>
+                      <a:tailEnd type="none" w="med" len="med"/>
+                    </a:lnB>
+                    <a:lnTlToBr w="12700" cmpd="sng">
+                      <a:noFill/>
+                      <a:prstDash val="solid"/>
+                    </a:lnTlToBr>
+                    <a:lnBlToTr w="12700" cmpd="sng">
+                      <a:noFill/>
+                      <a:prstDash val="solid"/>
+                    </a:lnBlToTr>
+                    <a:noFill/>
+                  </a:tcPr>
+                </a:tc>
+                <a:extLst>
+                  <a:ext uri="{0D108BD9-81ED-4DB2-BD59-A6C34878D82A}">
+                    <a16:rowId xmlns:a16="http://schemas.microsoft.com/office/drawing/2014/main" val="3892706503"/>
+                  </a:ext>
+                </a:extLst>
+              </a:tr>
+              <a:tr h="219891">
+                <a:tc>
+                  <a:txBody>
+                    <a:bodyPr/>
+                    <a:lstStyle/>
+                    <a:p>
+                      <a:pPr algn="ctr" rtl="0"/>
+                      <a:r>
+                        <a:rPr lang="en-US" sz="1400" b="0" dirty="0">
+                          <a:solidFill>
+                            <a:schemeClr val="tx1"/>
+                          </a:solidFill>
+                          <a:latin typeface="David" panose="020E0502060401010101" pitchFamily="34" charset="-79"/>
+                          <a:cs typeface="David" panose="020E0502060401010101" pitchFamily="34" charset="-79"/>
+                        </a:rPr>
+                        <a:t>4</a:t>
+                      </a:r>
+                      <a:endParaRPr lang="he-IL" sz="1400" b="0" dirty="0">
+                        <a:solidFill>
+                          <a:schemeClr val="tx1"/>
+                        </a:solidFill>
+                        <a:latin typeface="David" panose="020E0502060401010101" pitchFamily="34" charset="-79"/>
+                        <a:cs typeface="David" panose="020E0502060401010101" pitchFamily="34" charset="-79"/>
+                      </a:endParaRPr>
+                    </a:p>
+                  </a:txBody>
+                  <a:tcPr marL="0" marR="0" marT="0" marB="0" anchor="ctr">
+                    <a:lnL w="12700" cap="flat" cmpd="sng" algn="ctr">
+                      <a:solidFill>
+                        <a:schemeClr val="tx1"/>
+                      </a:solidFill>
+                      <a:prstDash val="solid"/>
+                      <a:round/>
+                      <a:headEnd type="none" w="med" len="med"/>
+                      <a:tailEnd type="none" w="med" len="med"/>
+                    </a:lnL>
+                    <a:lnR w="12700" cap="flat" cmpd="sng" algn="ctr">
+                      <a:solidFill>
+                        <a:schemeClr val="tx1"/>
+                      </a:solidFill>
+                      <a:prstDash val="solid"/>
+                      <a:round/>
+                      <a:headEnd type="none" w="med" len="med"/>
+                      <a:tailEnd type="none" w="med" len="med"/>
+                    </a:lnR>
+                    <a:lnT w="12700" cap="flat" cmpd="sng" algn="ctr">
+                      <a:solidFill>
+                        <a:schemeClr val="tx1"/>
+                      </a:solidFill>
+                      <a:prstDash val="solid"/>
+                      <a:round/>
+                      <a:headEnd type="none" w="med" len="med"/>
+                      <a:tailEnd type="none" w="med" len="med"/>
+                    </a:lnT>
+                    <a:lnB w="12700" cap="flat" cmpd="sng" algn="ctr">
+                      <a:solidFill>
+                        <a:schemeClr val="tx1"/>
+                      </a:solidFill>
+                      <a:prstDash val="solid"/>
+                      <a:round/>
+                      <a:headEnd type="none" w="med" len="med"/>
+                      <a:tailEnd type="none" w="med" len="med"/>
+                    </a:lnB>
+                    <a:noFill/>
+                  </a:tcPr>
+                </a:tc>
+                <a:tc>
+                  <a:txBody>
+                    <a:bodyPr/>
+                    <a:lstStyle/>
+                    <a:p>
+                      <a:pPr algn="ctr" rtl="0"/>
+                      <a:r>
+                        <a:rPr lang="en-US" sz="1400" b="0" dirty="0">
+                          <a:solidFill>
+                            <a:schemeClr val="tx1"/>
+                          </a:solidFill>
+                          <a:latin typeface="David" panose="020E0502060401010101" pitchFamily="34" charset="-79"/>
+                          <a:cs typeface="David" panose="020E0502060401010101" pitchFamily="34" charset="-79"/>
+                        </a:rPr>
+                        <a:t>2</a:t>
+                      </a:r>
+                      <a:endParaRPr lang="he-IL" sz="1400" b="0" dirty="0">
+                        <a:solidFill>
+                          <a:schemeClr val="tx1"/>
+                        </a:solidFill>
+                        <a:latin typeface="David" panose="020E0502060401010101" pitchFamily="34" charset="-79"/>
+                        <a:cs typeface="David" panose="020E0502060401010101" pitchFamily="34" charset="-79"/>
+                      </a:endParaRPr>
+                    </a:p>
+                  </a:txBody>
+                  <a:tcPr marL="0" marR="0" marT="0" marB="0" anchor="ctr">
+                    <a:lnL w="12700" cap="flat" cmpd="sng" algn="ctr">
+                      <a:solidFill>
+                        <a:schemeClr val="tx1"/>
+                      </a:solidFill>
+                      <a:prstDash val="solid"/>
+                      <a:round/>
+                      <a:headEnd type="none" w="med" len="med"/>
+                      <a:tailEnd type="none" w="med" len="med"/>
+                    </a:lnL>
+                    <a:lnR w="12700" cap="flat" cmpd="sng" algn="ctr">
+                      <a:solidFill>
+                        <a:schemeClr val="tx1"/>
+                      </a:solidFill>
+                      <a:prstDash val="solid"/>
+                      <a:round/>
+                      <a:headEnd type="none" w="med" len="med"/>
+                      <a:tailEnd type="none" w="med" len="med"/>
+                    </a:lnR>
+                    <a:lnT w="12700" cap="flat" cmpd="sng" algn="ctr">
+                      <a:solidFill>
+                        <a:schemeClr val="tx1"/>
+                      </a:solidFill>
+                      <a:prstDash val="solid"/>
+                      <a:round/>
+                      <a:headEnd type="none" w="med" len="med"/>
+                      <a:tailEnd type="none" w="med" len="med"/>
+                    </a:lnT>
+                    <a:lnB w="12700" cap="flat" cmpd="sng" algn="ctr">
+                      <a:solidFill>
+                        <a:schemeClr val="tx1"/>
+                      </a:solidFill>
+                      <a:prstDash val="solid"/>
+                      <a:round/>
+                      <a:headEnd type="none" w="med" len="med"/>
+                      <a:tailEnd type="none" w="med" len="med"/>
+                    </a:lnB>
+                    <a:noFill/>
+                  </a:tcPr>
+                </a:tc>
+                <a:tc>
+                  <a:txBody>
+                    <a:bodyPr/>
+                    <a:lstStyle/>
+                    <a:p>
+                      <a:pPr algn="ctr" rtl="0"/>
+                      <a:r>
+                        <a:rPr lang="en-US" sz="1400" b="0" dirty="0">
+                          <a:solidFill>
+                            <a:schemeClr val="tx1"/>
+                          </a:solidFill>
+                          <a:latin typeface="David" panose="020E0502060401010101" pitchFamily="34" charset="-79"/>
+                          <a:cs typeface="David" panose="020E0502060401010101" pitchFamily="34" charset="-79"/>
+                        </a:rPr>
+                        <a:t>3</a:t>
+                      </a:r>
+                      <a:endParaRPr lang="he-IL" sz="1400" b="0" dirty="0">
+                        <a:solidFill>
+                          <a:schemeClr val="tx1"/>
+                        </a:solidFill>
+                        <a:latin typeface="David" panose="020E0502060401010101" pitchFamily="34" charset="-79"/>
+                        <a:cs typeface="David" panose="020E0502060401010101" pitchFamily="34" charset="-79"/>
+                      </a:endParaRPr>
+                    </a:p>
+                  </a:txBody>
+                  <a:tcPr marL="0" marR="0" marT="0" marB="0" anchor="ctr">
+                    <a:lnL w="12700" cap="flat" cmpd="sng" algn="ctr">
+                      <a:solidFill>
+                        <a:schemeClr val="tx1"/>
+                      </a:solidFill>
+                      <a:prstDash val="solid"/>
+                      <a:round/>
+                      <a:headEnd type="none" w="med" len="med"/>
+                      <a:tailEnd type="none" w="med" len="med"/>
+                    </a:lnL>
+                    <a:lnR w="12700" cap="flat" cmpd="sng" algn="ctr">
+                      <a:solidFill>
+                        <a:schemeClr val="tx1"/>
+                      </a:solidFill>
+                      <a:prstDash val="solid"/>
+                      <a:round/>
+                      <a:headEnd type="none" w="med" len="med"/>
+                      <a:tailEnd type="none" w="med" len="med"/>
+                    </a:lnR>
+                    <a:lnT w="12700" cap="flat" cmpd="sng" algn="ctr">
+                      <a:solidFill>
+                        <a:schemeClr val="tx1"/>
+                      </a:solidFill>
+                      <a:prstDash val="solid"/>
+                      <a:round/>
+                      <a:headEnd type="none" w="med" len="med"/>
+                      <a:tailEnd type="none" w="med" len="med"/>
+                    </a:lnT>
+                    <a:lnB w="12700" cap="flat" cmpd="sng" algn="ctr">
+                      <a:solidFill>
+                        <a:schemeClr val="tx1"/>
+                      </a:solidFill>
+                      <a:prstDash val="solid"/>
+                      <a:round/>
+                      <a:headEnd type="none" w="med" len="med"/>
+                      <a:tailEnd type="none" w="med" len="med"/>
+                    </a:lnB>
+                    <a:noFill/>
+                  </a:tcPr>
+                </a:tc>
+                <a:tc>
+                  <a:txBody>
+                    <a:bodyPr/>
+                    <a:lstStyle/>
+                    <a:p>
+                      <a:pPr algn="ctr" rtl="0"/>
+                      <a:r>
+                        <a:rPr lang="en-US" sz="1400" b="0" dirty="0">
+                          <a:solidFill>
+                            <a:schemeClr val="tx1"/>
+                          </a:solidFill>
+                          <a:latin typeface="David" panose="020E0502060401010101" pitchFamily="34" charset="-79"/>
+                          <a:cs typeface="David" panose="020E0502060401010101" pitchFamily="34" charset="-79"/>
+                        </a:rPr>
+                        <a:t>1</a:t>
+                      </a:r>
+                      <a:endParaRPr lang="he-IL" sz="1400" b="0" dirty="0">
+                        <a:solidFill>
+                          <a:schemeClr val="tx1"/>
+                        </a:solidFill>
+                        <a:latin typeface="David" panose="020E0502060401010101" pitchFamily="34" charset="-79"/>
+                        <a:cs typeface="David" panose="020E0502060401010101" pitchFamily="34" charset="-79"/>
+                      </a:endParaRPr>
+                    </a:p>
+                  </a:txBody>
+                  <a:tcPr marL="0" marR="0" marT="0" marB="0" anchor="ctr">
+                    <a:lnL w="12700" cap="flat" cmpd="sng" algn="ctr">
+                      <a:solidFill>
+                        <a:schemeClr val="tx1"/>
+                      </a:solidFill>
+                      <a:prstDash val="solid"/>
+                      <a:round/>
+                      <a:headEnd type="none" w="med" len="med"/>
+                      <a:tailEnd type="none" w="med" len="med"/>
+                    </a:lnL>
+                    <a:lnR w="12700" cap="flat" cmpd="sng" algn="ctr">
+                      <a:solidFill>
+                        <a:schemeClr val="tx1"/>
+                      </a:solidFill>
+                      <a:prstDash val="solid"/>
+                      <a:round/>
+                      <a:headEnd type="none" w="med" len="med"/>
+                      <a:tailEnd type="none" w="med" len="med"/>
+                    </a:lnR>
+                    <a:lnT w="12700" cap="flat" cmpd="sng" algn="ctr">
+                      <a:solidFill>
+                        <a:schemeClr val="tx1"/>
+                      </a:solidFill>
+                      <a:prstDash val="solid"/>
+                      <a:round/>
+                      <a:headEnd type="none" w="med" len="med"/>
+                      <a:tailEnd type="none" w="med" len="med"/>
+                    </a:lnT>
+                    <a:lnB w="12700" cap="flat" cmpd="sng" algn="ctr">
+                      <a:solidFill>
+                        <a:schemeClr val="tx1"/>
+                      </a:solidFill>
+                      <a:prstDash val="solid"/>
+                      <a:round/>
+                      <a:headEnd type="none" w="med" len="med"/>
+                      <a:tailEnd type="none" w="med" len="med"/>
+                    </a:lnB>
+                    <a:noFill/>
+                  </a:tcPr>
+                </a:tc>
+                <a:tc>
+                  <a:txBody>
+                    <a:bodyPr/>
+                    <a:lstStyle/>
+                    <a:p>
+                      <a:pPr algn="ctr" rtl="0"/>
+                      <a:r>
+                        <a:rPr lang="en-US" sz="1400" b="0" dirty="0">
+                          <a:solidFill>
+                            <a:schemeClr val="tx1">
+                              <a:alpha val="50000"/>
+                            </a:schemeClr>
+                          </a:solidFill>
+                          <a:latin typeface="David" panose="020E0502060401010101" pitchFamily="34" charset="-79"/>
+                          <a:cs typeface="David" panose="020E0502060401010101" pitchFamily="34" charset="-79"/>
+                        </a:rPr>
+                        <a:t>0</a:t>
+                      </a:r>
+                      <a:endParaRPr lang="he-IL" sz="1400" b="0" dirty="0">
+                        <a:solidFill>
+                          <a:schemeClr val="tx1">
+                            <a:alpha val="50000"/>
+                          </a:schemeClr>
+                        </a:solidFill>
+                        <a:latin typeface="David" panose="020E0502060401010101" pitchFamily="34" charset="-79"/>
+                        <a:cs typeface="David" panose="020E0502060401010101" pitchFamily="34" charset="-79"/>
+                      </a:endParaRPr>
+                    </a:p>
+                  </a:txBody>
+                  <a:tcPr marL="0" marR="0" marT="0" marB="0" anchor="ctr">
+                    <a:lnL w="12700" cap="flat" cmpd="sng" algn="ctr">
+                      <a:solidFill>
+                        <a:schemeClr val="tx1"/>
+                      </a:solidFill>
+                      <a:prstDash val="solid"/>
+                      <a:round/>
+                      <a:headEnd type="none" w="med" len="med"/>
+                      <a:tailEnd type="none" w="med" len="med"/>
+                    </a:lnL>
+                    <a:lnR w="12700" cap="flat" cmpd="sng" algn="ctr">
+                      <a:noFill/>
+                      <a:prstDash val="solid"/>
+                      <a:round/>
+                      <a:headEnd type="none" w="med" len="med"/>
+                      <a:tailEnd type="none" w="med" len="med"/>
+                    </a:lnR>
+                    <a:lnT w="12700" cap="flat" cmpd="sng" algn="ctr">
+                      <a:noFill/>
+                      <a:prstDash val="solid"/>
+                      <a:round/>
+                      <a:headEnd type="none" w="med" len="med"/>
+                      <a:tailEnd type="none" w="med" len="med"/>
+                    </a:lnT>
+                    <a:lnB w="12700" cap="flat" cmpd="sng" algn="ctr">
+                      <a:noFill/>
+                      <a:prstDash val="solid"/>
+                      <a:round/>
+                      <a:headEnd type="none" w="med" len="med"/>
+                      <a:tailEnd type="none" w="med" len="med"/>
+                    </a:lnB>
+                    <a:lnTlToBr w="12700" cmpd="sng">
+                      <a:noFill/>
+                      <a:prstDash val="solid"/>
+                    </a:lnTlToBr>
+                    <a:lnBlToTr w="12700" cmpd="sng">
+                      <a:noFill/>
+                      <a:prstDash val="solid"/>
+                    </a:lnBlToTr>
+                    <a:noFill/>
+                  </a:tcPr>
+                </a:tc>
+                <a:extLst>
+                  <a:ext uri="{0D108BD9-81ED-4DB2-BD59-A6C34878D82A}">
+                    <a16:rowId xmlns:a16="http://schemas.microsoft.com/office/drawing/2014/main" val="1936984448"/>
+                  </a:ext>
+                </a:extLst>
+              </a:tr>
+            </a:tbl>
+          </a:graphicData>
+        </a:graphic>
+      </p:graphicFrame>
+    </p:spTree>
+    <p:extLst>
+      <p:ext uri="{BB962C8B-B14F-4D97-AF65-F5344CB8AC3E}">
+        <p14:creationId xmlns:p14="http://schemas.microsoft.com/office/powerpoint/2010/main" val="2673739759"/>
+      </p:ext>
+    </p:extLst>
+  </p:cSld>
+  <p:clrMapOvr>
+    <a:masterClrMapping/>
+  </p:clrMapOvr>
+</p:sld>
+</file>
+
 <file path=ppt/theme/theme1.xml><?xml version="1.0" encoding="utf-8"?>
 <a:theme xmlns:a="http://schemas.openxmlformats.org/drawingml/2006/main" name="Office Theme">
   <a:themeElements>

</xml_diff>

<commit_message>
gave a first solution to 5 and checked to see that 7 worked correctly, sorry
</commit_message>
<xml_diff>
--- a/hw1_images.pptx
+++ b/hw1_images.pptx
@@ -105,6 +105,11 @@
       </a:defRPr>
     </a:lvl9pPr>
   </p:defaultTextStyle>
+  <p:extLst>
+    <p:ext uri="{EFAFB233-063F-42B5-8137-9DF3F51BA10A}">
+      <p15:sldGuideLst xmlns:p15="http://schemas.microsoft.com/office/powerpoint/2012/main"/>
+    </p:ext>
+  </p:extLst>
 </p:presentation>
 </file>
 
@@ -257,7 +262,7 @@
           <a:p>
             <a:fld id="{F9224AD2-5C0A-4A32-A676-9528AEBA74CB}" type="datetimeFigureOut">
               <a:rPr lang="he-IL" smtClean="0"/>
-              <a:t>י"ז/כסלו/תשפ"ב</a:t>
+              <a:t>כ"ד/כסלו/תשפ"ב</a:t>
             </a:fld>
             <a:endParaRPr lang="he-IL"/>
           </a:p>
@@ -457,7 +462,7 @@
           <a:p>
             <a:fld id="{F9224AD2-5C0A-4A32-A676-9528AEBA74CB}" type="datetimeFigureOut">
               <a:rPr lang="he-IL" smtClean="0"/>
-              <a:t>י"ז/כסלו/תשפ"ב</a:t>
+              <a:t>כ"ד/כסלו/תשפ"ב</a:t>
             </a:fld>
             <a:endParaRPr lang="he-IL"/>
           </a:p>
@@ -667,7 +672,7 @@
           <a:p>
             <a:fld id="{F9224AD2-5C0A-4A32-A676-9528AEBA74CB}" type="datetimeFigureOut">
               <a:rPr lang="he-IL" smtClean="0"/>
-              <a:t>י"ז/כסלו/תשפ"ב</a:t>
+              <a:t>כ"ד/כסלו/תשפ"ב</a:t>
             </a:fld>
             <a:endParaRPr lang="he-IL"/>
           </a:p>
@@ -867,7 +872,7 @@
           <a:p>
             <a:fld id="{F9224AD2-5C0A-4A32-A676-9528AEBA74CB}" type="datetimeFigureOut">
               <a:rPr lang="he-IL" smtClean="0"/>
-              <a:t>י"ז/כסלו/תשפ"ב</a:t>
+              <a:t>כ"ד/כסלו/תשפ"ב</a:t>
             </a:fld>
             <a:endParaRPr lang="he-IL"/>
           </a:p>
@@ -1143,7 +1148,7 @@
           <a:p>
             <a:fld id="{F9224AD2-5C0A-4A32-A676-9528AEBA74CB}" type="datetimeFigureOut">
               <a:rPr lang="he-IL" smtClean="0"/>
-              <a:t>י"ז/כסלו/תשפ"ב</a:t>
+              <a:t>כ"ד/כסלו/תשפ"ב</a:t>
             </a:fld>
             <a:endParaRPr lang="he-IL"/>
           </a:p>
@@ -1411,7 +1416,7 @@
           <a:p>
             <a:fld id="{F9224AD2-5C0A-4A32-A676-9528AEBA74CB}" type="datetimeFigureOut">
               <a:rPr lang="he-IL" smtClean="0"/>
-              <a:t>י"ז/כסלו/תשפ"ב</a:t>
+              <a:t>כ"ד/כסלו/תשפ"ב</a:t>
             </a:fld>
             <a:endParaRPr lang="he-IL"/>
           </a:p>
@@ -1826,7 +1831,7 @@
           <a:p>
             <a:fld id="{F9224AD2-5C0A-4A32-A676-9528AEBA74CB}" type="datetimeFigureOut">
               <a:rPr lang="he-IL" smtClean="0"/>
-              <a:t>י"ז/כסלו/תשפ"ב</a:t>
+              <a:t>כ"ד/כסלו/תשפ"ב</a:t>
             </a:fld>
             <a:endParaRPr lang="he-IL"/>
           </a:p>
@@ -1968,7 +1973,7 @@
           <a:p>
             <a:fld id="{F9224AD2-5C0A-4A32-A676-9528AEBA74CB}" type="datetimeFigureOut">
               <a:rPr lang="he-IL" smtClean="0"/>
-              <a:t>י"ז/כסלו/תשפ"ב</a:t>
+              <a:t>כ"ד/כסלו/תשפ"ב</a:t>
             </a:fld>
             <a:endParaRPr lang="he-IL"/>
           </a:p>
@@ -2081,7 +2086,7 @@
           <a:p>
             <a:fld id="{F9224AD2-5C0A-4A32-A676-9528AEBA74CB}" type="datetimeFigureOut">
               <a:rPr lang="he-IL" smtClean="0"/>
-              <a:t>י"ז/כסלו/תשפ"ב</a:t>
+              <a:t>כ"ד/כסלו/תשפ"ב</a:t>
             </a:fld>
             <a:endParaRPr lang="he-IL"/>
           </a:p>
@@ -2394,7 +2399,7 @@
           <a:p>
             <a:fld id="{F9224AD2-5C0A-4A32-A676-9528AEBA74CB}" type="datetimeFigureOut">
               <a:rPr lang="he-IL" smtClean="0"/>
-              <a:t>י"ז/כסלו/תשפ"ב</a:t>
+              <a:t>כ"ד/כסלו/תשפ"ב</a:t>
             </a:fld>
             <a:endParaRPr lang="he-IL"/>
           </a:p>
@@ -2683,7 +2688,7 @@
           <a:p>
             <a:fld id="{F9224AD2-5C0A-4A32-A676-9528AEBA74CB}" type="datetimeFigureOut">
               <a:rPr lang="he-IL" smtClean="0"/>
-              <a:t>י"ז/כסלו/תשפ"ב</a:t>
+              <a:t>כ"ד/כסלו/תשפ"ב</a:t>
             </a:fld>
             <a:endParaRPr lang="he-IL"/>
           </a:p>
@@ -2926,7 +2931,7 @@
           <a:p>
             <a:fld id="{F9224AD2-5C0A-4A32-A676-9528AEBA74CB}" type="datetimeFigureOut">
               <a:rPr lang="he-IL" smtClean="0"/>
-              <a:t>י"ז/כסלו/תשפ"ב</a:t>
+              <a:t>כ"ד/כסלו/תשפ"ב</a:t>
             </a:fld>
             <a:endParaRPr lang="he-IL"/>
           </a:p>
@@ -11732,6 +11737,1136 @@
           </a:graphicData>
         </a:graphic>
       </p:graphicFrame>
+      <p:graphicFrame>
+        <p:nvGraphicFramePr>
+          <p:cNvPr id="3" name="Table 5">
+            <a:extLst>
+              <a:ext uri="{FF2B5EF4-FFF2-40B4-BE49-F238E27FC236}">
+                <a16:creationId xmlns:a16="http://schemas.microsoft.com/office/drawing/2014/main" id="{33A60E8D-A3EB-4A46-9F4D-11EC8BADFA31}"/>
+              </a:ext>
+            </a:extLst>
+          </p:cNvPr>
+          <p:cNvGraphicFramePr>
+            <a:graphicFrameLocks noGrp="1"/>
+          </p:cNvGraphicFramePr>
+          <p:nvPr>
+            <p:extLst>
+              <p:ext uri="{D42A27DB-BD31-4B8C-83A1-F6EECF244321}">
+                <p14:modId xmlns:p14="http://schemas.microsoft.com/office/powerpoint/2010/main" val="2619167542"/>
+              </p:ext>
+            </p:extLst>
+          </p:nvPr>
+        </p:nvGraphicFramePr>
+        <p:xfrm>
+          <a:off x="9199581" y="321458"/>
+          <a:ext cx="660688" cy="879564"/>
+        </p:xfrm>
+        <a:graphic>
+          <a:graphicData uri="http://schemas.openxmlformats.org/drawingml/2006/table">
+            <a:tbl>
+              <a:tblPr rtl="1" firstRow="1" bandRow="1">
+                <a:tableStyleId>{5C22544A-7EE6-4342-B048-85BDC9FD1C3A}</a:tableStyleId>
+              </a:tblPr>
+              <a:tblGrid>
+                <a:gridCol w="165172">
+                  <a:extLst>
+                    <a:ext uri="{9D8B030D-6E8A-4147-A177-3AD203B41FA5}">
+                      <a16:colId xmlns:a16="http://schemas.microsoft.com/office/drawing/2014/main" val="1569400049"/>
+                    </a:ext>
+                  </a:extLst>
+                </a:gridCol>
+                <a:gridCol w="165172">
+                  <a:extLst>
+                    <a:ext uri="{9D8B030D-6E8A-4147-A177-3AD203B41FA5}">
+                      <a16:colId xmlns:a16="http://schemas.microsoft.com/office/drawing/2014/main" val="929146903"/>
+                    </a:ext>
+                  </a:extLst>
+                </a:gridCol>
+                <a:gridCol w="165172">
+                  <a:extLst>
+                    <a:ext uri="{9D8B030D-6E8A-4147-A177-3AD203B41FA5}">
+                      <a16:colId xmlns:a16="http://schemas.microsoft.com/office/drawing/2014/main" val="1205294750"/>
+                    </a:ext>
+                  </a:extLst>
+                </a:gridCol>
+                <a:gridCol w="165172">
+                  <a:extLst>
+                    <a:ext uri="{9D8B030D-6E8A-4147-A177-3AD203B41FA5}">
+                      <a16:colId xmlns:a16="http://schemas.microsoft.com/office/drawing/2014/main" val="2519948292"/>
+                    </a:ext>
+                  </a:extLst>
+                </a:gridCol>
+              </a:tblGrid>
+              <a:tr h="219891">
+                <a:tc>
+                  <a:txBody>
+                    <a:bodyPr/>
+                    <a:lstStyle/>
+                    <a:p>
+                      <a:pPr algn="ctr" rtl="0"/>
+                      <a:r>
+                        <a:rPr lang="en-US" sz="1400" b="0" dirty="0">
+                          <a:solidFill>
+                            <a:schemeClr val="tx1">
+                              <a:alpha val="50000"/>
+                            </a:schemeClr>
+                          </a:solidFill>
+                          <a:latin typeface="David" panose="020E0502060401010101" pitchFamily="34" charset="-79"/>
+                          <a:cs typeface="David" panose="020E0502060401010101" pitchFamily="34" charset="-79"/>
+                        </a:rPr>
+                        <a:t>2</a:t>
+                      </a:r>
+                      <a:endParaRPr lang="he-IL" sz="1400" b="0" dirty="0">
+                        <a:solidFill>
+                          <a:schemeClr val="tx1">
+                            <a:alpha val="50000"/>
+                          </a:schemeClr>
+                        </a:solidFill>
+                        <a:latin typeface="David" panose="020E0502060401010101" pitchFamily="34" charset="-79"/>
+                        <a:cs typeface="David" panose="020E0502060401010101" pitchFamily="34" charset="-79"/>
+                      </a:endParaRPr>
+                    </a:p>
+                  </a:txBody>
+                  <a:tcPr marL="0" marR="0" marT="0" marB="0" anchor="ctr">
+                    <a:lnL w="12700" cap="flat" cmpd="sng" algn="ctr">
+                      <a:noFill/>
+                      <a:prstDash val="solid"/>
+                      <a:round/>
+                      <a:headEnd type="none" w="med" len="med"/>
+                      <a:tailEnd type="none" w="med" len="med"/>
+                    </a:lnL>
+                    <a:lnR w="12700" cap="flat" cmpd="sng" algn="ctr">
+                      <a:noFill/>
+                      <a:prstDash val="solid"/>
+                      <a:round/>
+                      <a:headEnd type="none" w="med" len="med"/>
+                      <a:tailEnd type="none" w="med" len="med"/>
+                    </a:lnR>
+                    <a:lnT w="12700" cap="flat" cmpd="sng" algn="ctr">
+                      <a:noFill/>
+                      <a:prstDash val="solid"/>
+                      <a:round/>
+                      <a:headEnd type="none" w="med" len="med"/>
+                      <a:tailEnd type="none" w="med" len="med"/>
+                    </a:lnT>
+                    <a:lnB w="12700" cap="flat" cmpd="sng" algn="ctr">
+                      <a:solidFill>
+                        <a:schemeClr val="tx1"/>
+                      </a:solidFill>
+                      <a:prstDash val="solid"/>
+                      <a:round/>
+                      <a:headEnd type="none" w="med" len="med"/>
+                      <a:tailEnd type="none" w="med" len="med"/>
+                    </a:lnB>
+                    <a:lnTlToBr w="12700" cmpd="sng">
+                      <a:noFill/>
+                      <a:prstDash val="solid"/>
+                    </a:lnTlToBr>
+                    <a:lnBlToTr w="12700" cmpd="sng">
+                      <a:noFill/>
+                      <a:prstDash val="solid"/>
+                    </a:lnBlToTr>
+                    <a:noFill/>
+                  </a:tcPr>
+                </a:tc>
+                <a:tc>
+                  <a:txBody>
+                    <a:bodyPr/>
+                    <a:lstStyle/>
+                    <a:p>
+                      <a:pPr algn="ctr" rtl="0"/>
+                      <a:r>
+                        <a:rPr lang="en-US" sz="1400" b="0" dirty="0">
+                          <a:solidFill>
+                            <a:schemeClr val="tx1">
+                              <a:alpha val="50000"/>
+                            </a:schemeClr>
+                          </a:solidFill>
+                          <a:latin typeface="David" panose="020E0502060401010101" pitchFamily="34" charset="-79"/>
+                          <a:cs typeface="David" panose="020E0502060401010101" pitchFamily="34" charset="-79"/>
+                        </a:rPr>
+                        <a:t>1</a:t>
+                      </a:r>
+                      <a:endParaRPr lang="he-IL" sz="1400" b="0" dirty="0">
+                        <a:solidFill>
+                          <a:schemeClr val="tx1">
+                            <a:alpha val="50000"/>
+                          </a:schemeClr>
+                        </a:solidFill>
+                        <a:latin typeface="David" panose="020E0502060401010101" pitchFamily="34" charset="-79"/>
+                        <a:cs typeface="David" panose="020E0502060401010101" pitchFamily="34" charset="-79"/>
+                      </a:endParaRPr>
+                    </a:p>
+                  </a:txBody>
+                  <a:tcPr marL="0" marR="0" marT="0" marB="0" anchor="ctr">
+                    <a:lnL w="12700" cap="flat" cmpd="sng" algn="ctr">
+                      <a:noFill/>
+                      <a:prstDash val="solid"/>
+                      <a:round/>
+                      <a:headEnd type="none" w="med" len="med"/>
+                      <a:tailEnd type="none" w="med" len="med"/>
+                    </a:lnL>
+                    <a:lnR w="12700" cap="flat" cmpd="sng" algn="ctr">
+                      <a:noFill/>
+                      <a:prstDash val="solid"/>
+                      <a:round/>
+                      <a:headEnd type="none" w="med" len="med"/>
+                      <a:tailEnd type="none" w="med" len="med"/>
+                    </a:lnR>
+                    <a:lnT w="12700" cap="flat" cmpd="sng" algn="ctr">
+                      <a:noFill/>
+                      <a:prstDash val="solid"/>
+                      <a:round/>
+                      <a:headEnd type="none" w="med" len="med"/>
+                      <a:tailEnd type="none" w="med" len="med"/>
+                    </a:lnT>
+                    <a:lnB w="12700" cap="flat" cmpd="sng" algn="ctr">
+                      <a:solidFill>
+                        <a:schemeClr val="tx1"/>
+                      </a:solidFill>
+                      <a:prstDash val="solid"/>
+                      <a:round/>
+                      <a:headEnd type="none" w="med" len="med"/>
+                      <a:tailEnd type="none" w="med" len="med"/>
+                    </a:lnB>
+                    <a:lnTlToBr w="12700" cmpd="sng">
+                      <a:noFill/>
+                      <a:prstDash val="solid"/>
+                    </a:lnTlToBr>
+                    <a:lnBlToTr w="12700" cmpd="sng">
+                      <a:noFill/>
+                      <a:prstDash val="solid"/>
+                    </a:lnBlToTr>
+                    <a:noFill/>
+                  </a:tcPr>
+                </a:tc>
+                <a:tc>
+                  <a:txBody>
+                    <a:bodyPr/>
+                    <a:lstStyle/>
+                    <a:p>
+                      <a:pPr algn="ctr" rtl="0"/>
+                      <a:r>
+                        <a:rPr lang="en-US" sz="1400" b="0" dirty="0">
+                          <a:solidFill>
+                            <a:schemeClr val="tx1">
+                              <a:alpha val="50000"/>
+                            </a:schemeClr>
+                          </a:solidFill>
+                          <a:latin typeface="David" panose="020E0502060401010101" pitchFamily="34" charset="-79"/>
+                          <a:cs typeface="David" panose="020E0502060401010101" pitchFamily="34" charset="-79"/>
+                        </a:rPr>
+                        <a:t>0</a:t>
+                      </a:r>
+                      <a:endParaRPr lang="he-IL" sz="1400" b="0" dirty="0">
+                        <a:solidFill>
+                          <a:schemeClr val="tx1">
+                            <a:alpha val="50000"/>
+                          </a:schemeClr>
+                        </a:solidFill>
+                        <a:latin typeface="David" panose="020E0502060401010101" pitchFamily="34" charset="-79"/>
+                        <a:cs typeface="David" panose="020E0502060401010101" pitchFamily="34" charset="-79"/>
+                      </a:endParaRPr>
+                    </a:p>
+                  </a:txBody>
+                  <a:tcPr marL="0" marR="0" marT="0" marB="0" anchor="ctr">
+                    <a:lnL w="12700" cap="flat" cmpd="sng" algn="ctr">
+                      <a:noFill/>
+                      <a:prstDash val="solid"/>
+                      <a:round/>
+                      <a:headEnd type="none" w="med" len="med"/>
+                      <a:tailEnd type="none" w="med" len="med"/>
+                    </a:lnL>
+                    <a:lnR w="12700" cap="flat" cmpd="sng" algn="ctr">
+                      <a:noFill/>
+                      <a:prstDash val="solid"/>
+                      <a:round/>
+                      <a:headEnd type="none" w="med" len="med"/>
+                      <a:tailEnd type="none" w="med" len="med"/>
+                    </a:lnR>
+                    <a:lnT w="12700" cap="flat" cmpd="sng" algn="ctr">
+                      <a:noFill/>
+                      <a:prstDash val="solid"/>
+                      <a:round/>
+                      <a:headEnd type="none" w="med" len="med"/>
+                      <a:tailEnd type="none" w="med" len="med"/>
+                    </a:lnT>
+                    <a:lnB w="12700" cap="flat" cmpd="sng" algn="ctr">
+                      <a:solidFill>
+                        <a:schemeClr val="tx1"/>
+                      </a:solidFill>
+                      <a:prstDash val="solid"/>
+                      <a:round/>
+                      <a:headEnd type="none" w="med" len="med"/>
+                      <a:tailEnd type="none" w="med" len="med"/>
+                    </a:lnB>
+                    <a:lnTlToBr w="12700" cmpd="sng">
+                      <a:noFill/>
+                      <a:prstDash val="solid"/>
+                    </a:lnTlToBr>
+                    <a:lnBlToTr w="12700" cmpd="sng">
+                      <a:noFill/>
+                      <a:prstDash val="solid"/>
+                    </a:lnBlToTr>
+                    <a:noFill/>
+                  </a:tcPr>
+                </a:tc>
+                <a:tc>
+                  <a:txBody>
+                    <a:bodyPr/>
+                    <a:lstStyle/>
+                    <a:p>
+                      <a:pPr algn="ctr" rtl="0"/>
+                      <a:endParaRPr lang="he-IL" sz="1400" b="0" dirty="0">
+                        <a:solidFill>
+                          <a:schemeClr val="tx1"/>
+                        </a:solidFill>
+                        <a:latin typeface="David" panose="020E0502060401010101" pitchFamily="34" charset="-79"/>
+                        <a:cs typeface="David" panose="020E0502060401010101" pitchFamily="34" charset="-79"/>
+                      </a:endParaRPr>
+                    </a:p>
+                  </a:txBody>
+                  <a:tcPr marL="0" marR="0" marT="0" marB="0" anchor="ctr">
+                    <a:lnL w="12700" cap="flat" cmpd="sng" algn="ctr">
+                      <a:noFill/>
+                      <a:prstDash val="solid"/>
+                      <a:round/>
+                      <a:headEnd type="none" w="med" len="med"/>
+                      <a:tailEnd type="none" w="med" len="med"/>
+                    </a:lnL>
+                    <a:lnR w="12700" cap="flat" cmpd="sng" algn="ctr">
+                      <a:noFill/>
+                      <a:prstDash val="solid"/>
+                      <a:round/>
+                      <a:headEnd type="none" w="med" len="med"/>
+                      <a:tailEnd type="none" w="med" len="med"/>
+                    </a:lnR>
+                    <a:lnT w="12700" cap="flat" cmpd="sng" algn="ctr">
+                      <a:noFill/>
+                      <a:prstDash val="solid"/>
+                      <a:round/>
+                      <a:headEnd type="none" w="med" len="med"/>
+                      <a:tailEnd type="none" w="med" len="med"/>
+                    </a:lnT>
+                    <a:lnB w="12700" cap="flat" cmpd="sng" algn="ctr">
+                      <a:noFill/>
+                      <a:prstDash val="solid"/>
+                      <a:round/>
+                      <a:headEnd type="none" w="med" len="med"/>
+                      <a:tailEnd type="none" w="med" len="med"/>
+                    </a:lnB>
+                    <a:lnTlToBr w="12700" cmpd="sng">
+                      <a:noFill/>
+                      <a:prstDash val="solid"/>
+                    </a:lnTlToBr>
+                    <a:lnBlToTr w="12700" cmpd="sng">
+                      <a:noFill/>
+                      <a:prstDash val="solid"/>
+                    </a:lnBlToTr>
+                    <a:noFill/>
+                  </a:tcPr>
+                </a:tc>
+                <a:extLst>
+                  <a:ext uri="{0D108BD9-81ED-4DB2-BD59-A6C34878D82A}">
+                    <a16:rowId xmlns:a16="http://schemas.microsoft.com/office/drawing/2014/main" val="3892706503"/>
+                  </a:ext>
+                </a:extLst>
+              </a:tr>
+              <a:tr h="219891">
+                <a:tc>
+                  <a:txBody>
+                    <a:bodyPr/>
+                    <a:lstStyle/>
+                    <a:p>
+                      <a:pPr algn="ctr" rtl="0"/>
+                      <a:r>
+                        <a:rPr lang="en-US" sz="1400" b="0" dirty="0">
+                          <a:solidFill>
+                            <a:schemeClr val="tx1"/>
+                          </a:solidFill>
+                          <a:latin typeface="David" panose="020E0502060401010101" pitchFamily="34" charset="-79"/>
+                          <a:cs typeface="David" panose="020E0502060401010101" pitchFamily="34" charset="-79"/>
+                        </a:rPr>
+                        <a:t>0</a:t>
+                      </a:r>
+                      <a:endParaRPr lang="he-IL" sz="1400" b="0" dirty="0">
+                        <a:solidFill>
+                          <a:schemeClr val="tx1"/>
+                        </a:solidFill>
+                        <a:latin typeface="David" panose="020E0502060401010101" pitchFamily="34" charset="-79"/>
+                        <a:cs typeface="David" panose="020E0502060401010101" pitchFamily="34" charset="-79"/>
+                      </a:endParaRPr>
+                    </a:p>
+                  </a:txBody>
+                  <a:tcPr marL="0" marR="0" marT="0" marB="0" anchor="ctr">
+                    <a:lnL w="12700" cap="flat" cmpd="sng" algn="ctr">
+                      <a:solidFill>
+                        <a:schemeClr val="tx1"/>
+                      </a:solidFill>
+                      <a:prstDash val="solid"/>
+                      <a:round/>
+                      <a:headEnd type="none" w="med" len="med"/>
+                      <a:tailEnd type="none" w="med" len="med"/>
+                    </a:lnL>
+                    <a:lnR w="12700" cap="flat" cmpd="sng" algn="ctr">
+                      <a:solidFill>
+                        <a:schemeClr val="tx1"/>
+                      </a:solidFill>
+                      <a:prstDash val="solid"/>
+                      <a:round/>
+                      <a:headEnd type="none" w="med" len="med"/>
+                      <a:tailEnd type="none" w="med" len="med"/>
+                    </a:lnR>
+                    <a:lnT w="12700" cap="flat" cmpd="sng" algn="ctr">
+                      <a:solidFill>
+                        <a:schemeClr val="tx1"/>
+                      </a:solidFill>
+                      <a:prstDash val="solid"/>
+                      <a:round/>
+                      <a:headEnd type="none" w="med" len="med"/>
+                      <a:tailEnd type="none" w="med" len="med"/>
+                    </a:lnT>
+                    <a:lnB w="12700" cap="flat" cmpd="sng" algn="ctr">
+                      <a:solidFill>
+                        <a:schemeClr val="tx1"/>
+                      </a:solidFill>
+                      <a:prstDash val="solid"/>
+                      <a:round/>
+                      <a:headEnd type="none" w="med" len="med"/>
+                      <a:tailEnd type="none" w="med" len="med"/>
+                    </a:lnB>
+                    <a:noFill/>
+                  </a:tcPr>
+                </a:tc>
+                <a:tc>
+                  <a:txBody>
+                    <a:bodyPr/>
+                    <a:lstStyle/>
+                    <a:p>
+                      <a:pPr algn="ctr" rtl="0"/>
+                      <a:r>
+                        <a:rPr lang="he-IL" sz="1400" b="0" dirty="0">
+                          <a:solidFill>
+                            <a:schemeClr val="tx1"/>
+                          </a:solidFill>
+                          <a:latin typeface="David" panose="020E0502060401010101" pitchFamily="34" charset="-79"/>
+                          <a:cs typeface="David" panose="020E0502060401010101" pitchFamily="34" charset="-79"/>
+                        </a:rPr>
+                        <a:t>4</a:t>
+                      </a:r>
+                    </a:p>
+                  </a:txBody>
+                  <a:tcPr marL="0" marR="0" marT="0" marB="0" anchor="ctr">
+                    <a:lnL w="12700" cap="flat" cmpd="sng" algn="ctr">
+                      <a:solidFill>
+                        <a:schemeClr val="tx1"/>
+                      </a:solidFill>
+                      <a:prstDash val="solid"/>
+                      <a:round/>
+                      <a:headEnd type="none" w="med" len="med"/>
+                      <a:tailEnd type="none" w="med" len="med"/>
+                    </a:lnL>
+                    <a:lnR w="12700" cap="flat" cmpd="sng" algn="ctr">
+                      <a:solidFill>
+                        <a:schemeClr val="tx1"/>
+                      </a:solidFill>
+                      <a:prstDash val="solid"/>
+                      <a:round/>
+                      <a:headEnd type="none" w="med" len="med"/>
+                      <a:tailEnd type="none" w="med" len="med"/>
+                    </a:lnR>
+                    <a:lnT w="12700" cap="flat" cmpd="sng" algn="ctr">
+                      <a:solidFill>
+                        <a:schemeClr val="tx1"/>
+                      </a:solidFill>
+                      <a:prstDash val="solid"/>
+                      <a:round/>
+                      <a:headEnd type="none" w="med" len="med"/>
+                      <a:tailEnd type="none" w="med" len="med"/>
+                    </a:lnT>
+                    <a:lnB w="12700" cap="flat" cmpd="sng" algn="ctr">
+                      <a:solidFill>
+                        <a:schemeClr val="tx1"/>
+                      </a:solidFill>
+                      <a:prstDash val="solid"/>
+                      <a:round/>
+                      <a:headEnd type="none" w="med" len="med"/>
+                      <a:tailEnd type="none" w="med" len="med"/>
+                    </a:lnB>
+                    <a:noFill/>
+                  </a:tcPr>
+                </a:tc>
+                <a:tc>
+                  <a:txBody>
+                    <a:bodyPr/>
+                    <a:lstStyle/>
+                    <a:p>
+                      <a:pPr algn="ctr" rtl="0"/>
+                      <a:r>
+                        <a:rPr lang="en-US" sz="1400" b="0" dirty="0">
+                          <a:solidFill>
+                            <a:schemeClr val="tx1"/>
+                          </a:solidFill>
+                          <a:latin typeface="David" panose="020E0502060401010101" pitchFamily="34" charset="-79"/>
+                          <a:cs typeface="David" panose="020E0502060401010101" pitchFamily="34" charset="-79"/>
+                        </a:rPr>
+                        <a:t>0</a:t>
+                      </a:r>
+                      <a:endParaRPr lang="he-IL" sz="1400" b="0" dirty="0">
+                        <a:solidFill>
+                          <a:schemeClr val="tx1"/>
+                        </a:solidFill>
+                        <a:latin typeface="David" panose="020E0502060401010101" pitchFamily="34" charset="-79"/>
+                        <a:cs typeface="David" panose="020E0502060401010101" pitchFamily="34" charset="-79"/>
+                      </a:endParaRPr>
+                    </a:p>
+                  </a:txBody>
+                  <a:tcPr marL="0" marR="0" marT="0" marB="0" anchor="ctr">
+                    <a:lnL w="12700" cap="flat" cmpd="sng" algn="ctr">
+                      <a:solidFill>
+                        <a:schemeClr val="tx1"/>
+                      </a:solidFill>
+                      <a:prstDash val="solid"/>
+                      <a:round/>
+                      <a:headEnd type="none" w="med" len="med"/>
+                      <a:tailEnd type="none" w="med" len="med"/>
+                    </a:lnL>
+                    <a:lnR w="12700" cap="flat" cmpd="sng" algn="ctr">
+                      <a:solidFill>
+                        <a:schemeClr val="tx1"/>
+                      </a:solidFill>
+                      <a:prstDash val="solid"/>
+                      <a:round/>
+                      <a:headEnd type="none" w="med" len="med"/>
+                      <a:tailEnd type="none" w="med" len="med"/>
+                    </a:lnR>
+                    <a:lnT w="12700" cap="flat" cmpd="sng" algn="ctr">
+                      <a:solidFill>
+                        <a:schemeClr val="tx1"/>
+                      </a:solidFill>
+                      <a:prstDash val="solid"/>
+                      <a:round/>
+                      <a:headEnd type="none" w="med" len="med"/>
+                      <a:tailEnd type="none" w="med" len="med"/>
+                    </a:lnT>
+                    <a:lnB w="12700" cap="flat" cmpd="sng" algn="ctr">
+                      <a:solidFill>
+                        <a:schemeClr val="tx1"/>
+                      </a:solidFill>
+                      <a:prstDash val="solid"/>
+                      <a:round/>
+                      <a:headEnd type="none" w="med" len="med"/>
+                      <a:tailEnd type="none" w="med" len="med"/>
+                    </a:lnB>
+                    <a:noFill/>
+                  </a:tcPr>
+                </a:tc>
+                <a:tc>
+                  <a:txBody>
+                    <a:bodyPr/>
+                    <a:lstStyle/>
+                    <a:p>
+                      <a:pPr algn="ctr" rtl="0"/>
+                      <a:r>
+                        <a:rPr lang="en-US" sz="1400" b="0" dirty="0">
+                          <a:solidFill>
+                            <a:schemeClr val="tx1">
+                              <a:alpha val="50000"/>
+                            </a:schemeClr>
+                          </a:solidFill>
+                          <a:latin typeface="David" panose="020E0502060401010101" pitchFamily="34" charset="-79"/>
+                          <a:cs typeface="David" panose="020E0502060401010101" pitchFamily="34" charset="-79"/>
+                        </a:rPr>
+                        <a:t>0</a:t>
+                      </a:r>
+                      <a:endParaRPr lang="he-IL" sz="1400" b="0" dirty="0">
+                        <a:solidFill>
+                          <a:schemeClr val="tx1">
+                            <a:alpha val="50000"/>
+                          </a:schemeClr>
+                        </a:solidFill>
+                        <a:latin typeface="David" panose="020E0502060401010101" pitchFamily="34" charset="-79"/>
+                        <a:cs typeface="David" panose="020E0502060401010101" pitchFamily="34" charset="-79"/>
+                      </a:endParaRPr>
+                    </a:p>
+                  </a:txBody>
+                  <a:tcPr marL="0" marR="0" marT="0" marB="0" anchor="ctr">
+                    <a:lnL w="12700" cap="flat" cmpd="sng" algn="ctr">
+                      <a:solidFill>
+                        <a:schemeClr val="tx1"/>
+                      </a:solidFill>
+                      <a:prstDash val="solid"/>
+                      <a:round/>
+                      <a:headEnd type="none" w="med" len="med"/>
+                      <a:tailEnd type="none" w="med" len="med"/>
+                    </a:lnL>
+                    <a:lnR w="12700" cap="flat" cmpd="sng" algn="ctr">
+                      <a:noFill/>
+                      <a:prstDash val="solid"/>
+                      <a:round/>
+                      <a:headEnd type="none" w="med" len="med"/>
+                      <a:tailEnd type="none" w="med" len="med"/>
+                    </a:lnR>
+                    <a:lnT w="12700" cap="flat" cmpd="sng" algn="ctr">
+                      <a:noFill/>
+                      <a:prstDash val="solid"/>
+                      <a:round/>
+                      <a:headEnd type="none" w="med" len="med"/>
+                      <a:tailEnd type="none" w="med" len="med"/>
+                    </a:lnT>
+                    <a:lnB w="12700" cap="flat" cmpd="sng" algn="ctr">
+                      <a:noFill/>
+                      <a:prstDash val="solid"/>
+                      <a:round/>
+                      <a:headEnd type="none" w="med" len="med"/>
+                      <a:tailEnd type="none" w="med" len="med"/>
+                    </a:lnB>
+                    <a:lnTlToBr w="12700" cmpd="sng">
+                      <a:noFill/>
+                      <a:prstDash val="solid"/>
+                    </a:lnTlToBr>
+                    <a:lnBlToTr w="12700" cmpd="sng">
+                      <a:noFill/>
+                      <a:prstDash val="solid"/>
+                    </a:lnBlToTr>
+                    <a:noFill/>
+                  </a:tcPr>
+                </a:tc>
+                <a:extLst>
+                  <a:ext uri="{0D108BD9-81ED-4DB2-BD59-A6C34878D82A}">
+                    <a16:rowId xmlns:a16="http://schemas.microsoft.com/office/drawing/2014/main" val="1936984448"/>
+                  </a:ext>
+                </a:extLst>
+              </a:tr>
+              <a:tr h="219891">
+                <a:tc>
+                  <a:txBody>
+                    <a:bodyPr/>
+                    <a:lstStyle/>
+                    <a:p>
+                      <a:pPr algn="ctr" rtl="0"/>
+                      <a:r>
+                        <a:rPr lang="he-IL" sz="1400" b="0" dirty="0">
+                          <a:solidFill>
+                            <a:schemeClr val="tx1"/>
+                          </a:solidFill>
+                          <a:latin typeface="David" panose="020E0502060401010101" pitchFamily="34" charset="-79"/>
+                          <a:cs typeface="David" panose="020E0502060401010101" pitchFamily="34" charset="-79"/>
+                        </a:rPr>
+                        <a:t>1</a:t>
+                      </a:r>
+                    </a:p>
+                  </a:txBody>
+                  <a:tcPr marL="0" marR="0" marT="0" marB="0" anchor="ctr">
+                    <a:lnL w="12700" cap="flat" cmpd="sng" algn="ctr">
+                      <a:solidFill>
+                        <a:schemeClr val="tx1"/>
+                      </a:solidFill>
+                      <a:prstDash val="solid"/>
+                      <a:round/>
+                      <a:headEnd type="none" w="med" len="med"/>
+                      <a:tailEnd type="none" w="med" len="med"/>
+                    </a:lnL>
+                    <a:lnR w="12700" cap="flat" cmpd="sng" algn="ctr">
+                      <a:solidFill>
+                        <a:schemeClr val="tx1"/>
+                      </a:solidFill>
+                      <a:prstDash val="solid"/>
+                      <a:round/>
+                      <a:headEnd type="none" w="med" len="med"/>
+                      <a:tailEnd type="none" w="med" len="med"/>
+                    </a:lnR>
+                    <a:lnT w="12700" cap="flat" cmpd="sng" algn="ctr">
+                      <a:solidFill>
+                        <a:schemeClr val="tx1"/>
+                      </a:solidFill>
+                      <a:prstDash val="solid"/>
+                      <a:round/>
+                      <a:headEnd type="none" w="med" len="med"/>
+                      <a:tailEnd type="none" w="med" len="med"/>
+                    </a:lnT>
+                    <a:lnB w="12700" cap="flat" cmpd="sng" algn="ctr">
+                      <a:solidFill>
+                        <a:schemeClr val="tx1"/>
+                      </a:solidFill>
+                      <a:prstDash val="solid"/>
+                      <a:round/>
+                      <a:headEnd type="none" w="med" len="med"/>
+                      <a:tailEnd type="none" w="med" len="med"/>
+                    </a:lnB>
+                    <a:noFill/>
+                  </a:tcPr>
+                </a:tc>
+                <a:tc>
+                  <a:txBody>
+                    <a:bodyPr/>
+                    <a:lstStyle/>
+                    <a:p>
+                      <a:pPr algn="ctr" rtl="0"/>
+                      <a:r>
+                        <a:rPr lang="en-US" sz="1400" b="0" dirty="0">
+                          <a:solidFill>
+                            <a:schemeClr val="tx1"/>
+                          </a:solidFill>
+                          <a:latin typeface="David" panose="020E0502060401010101" pitchFamily="34" charset="-79"/>
+                          <a:cs typeface="David" panose="020E0502060401010101" pitchFamily="34" charset="-79"/>
+                        </a:rPr>
+                        <a:t>0</a:t>
+                      </a:r>
+                      <a:endParaRPr lang="he-IL" sz="1400" b="0" dirty="0">
+                        <a:solidFill>
+                          <a:schemeClr val="tx1"/>
+                        </a:solidFill>
+                        <a:latin typeface="David" panose="020E0502060401010101" pitchFamily="34" charset="-79"/>
+                        <a:cs typeface="David" panose="020E0502060401010101" pitchFamily="34" charset="-79"/>
+                      </a:endParaRPr>
+                    </a:p>
+                  </a:txBody>
+                  <a:tcPr marL="0" marR="0" marT="0" marB="0" anchor="ctr">
+                    <a:lnL w="12700" cap="flat" cmpd="sng" algn="ctr">
+                      <a:solidFill>
+                        <a:schemeClr val="tx1"/>
+                      </a:solidFill>
+                      <a:prstDash val="solid"/>
+                      <a:round/>
+                      <a:headEnd type="none" w="med" len="med"/>
+                      <a:tailEnd type="none" w="med" len="med"/>
+                    </a:lnL>
+                    <a:lnR w="12700" cap="flat" cmpd="sng" algn="ctr">
+                      <a:solidFill>
+                        <a:schemeClr val="tx1"/>
+                      </a:solidFill>
+                      <a:prstDash val="solid"/>
+                      <a:round/>
+                      <a:headEnd type="none" w="med" len="med"/>
+                      <a:tailEnd type="none" w="med" len="med"/>
+                    </a:lnR>
+                    <a:lnT w="12700" cap="flat" cmpd="sng" algn="ctr">
+                      <a:solidFill>
+                        <a:schemeClr val="tx1"/>
+                      </a:solidFill>
+                      <a:prstDash val="solid"/>
+                      <a:round/>
+                      <a:headEnd type="none" w="med" len="med"/>
+                      <a:tailEnd type="none" w="med" len="med"/>
+                    </a:lnT>
+                    <a:lnB w="12700" cap="flat" cmpd="sng" algn="ctr">
+                      <a:solidFill>
+                        <a:schemeClr val="tx1"/>
+                      </a:solidFill>
+                      <a:prstDash val="solid"/>
+                      <a:round/>
+                      <a:headEnd type="none" w="med" len="med"/>
+                      <a:tailEnd type="none" w="med" len="med"/>
+                    </a:lnB>
+                    <a:noFill/>
+                  </a:tcPr>
+                </a:tc>
+                <a:tc>
+                  <a:txBody>
+                    <a:bodyPr/>
+                    <a:lstStyle/>
+                    <a:p>
+                      <a:pPr algn="ctr" rtl="0"/>
+                      <a:r>
+                        <a:rPr lang="he-IL" sz="1400" b="0" dirty="0">
+                          <a:solidFill>
+                            <a:schemeClr val="tx1"/>
+                          </a:solidFill>
+                          <a:latin typeface="David" panose="020E0502060401010101" pitchFamily="34" charset="-79"/>
+                          <a:cs typeface="David" panose="020E0502060401010101" pitchFamily="34" charset="-79"/>
+                        </a:rPr>
+                        <a:t>2</a:t>
+                      </a:r>
+                    </a:p>
+                  </a:txBody>
+                  <a:tcPr marL="0" marR="0" marT="0" marB="0" anchor="ctr">
+                    <a:lnL w="12700" cap="flat" cmpd="sng" algn="ctr">
+                      <a:solidFill>
+                        <a:schemeClr val="tx1"/>
+                      </a:solidFill>
+                      <a:prstDash val="solid"/>
+                      <a:round/>
+                      <a:headEnd type="none" w="med" len="med"/>
+                      <a:tailEnd type="none" w="med" len="med"/>
+                    </a:lnL>
+                    <a:lnR w="12700" cap="flat" cmpd="sng" algn="ctr">
+                      <a:solidFill>
+                        <a:schemeClr val="tx1"/>
+                      </a:solidFill>
+                      <a:prstDash val="solid"/>
+                      <a:round/>
+                      <a:headEnd type="none" w="med" len="med"/>
+                      <a:tailEnd type="none" w="med" len="med"/>
+                    </a:lnR>
+                    <a:lnT w="12700" cap="flat" cmpd="sng" algn="ctr">
+                      <a:solidFill>
+                        <a:schemeClr val="tx1"/>
+                      </a:solidFill>
+                      <a:prstDash val="solid"/>
+                      <a:round/>
+                      <a:headEnd type="none" w="med" len="med"/>
+                      <a:tailEnd type="none" w="med" len="med"/>
+                    </a:lnT>
+                    <a:lnB w="12700" cap="flat" cmpd="sng" algn="ctr">
+                      <a:solidFill>
+                        <a:schemeClr val="tx1"/>
+                      </a:solidFill>
+                      <a:prstDash val="solid"/>
+                      <a:round/>
+                      <a:headEnd type="none" w="med" len="med"/>
+                      <a:tailEnd type="none" w="med" len="med"/>
+                    </a:lnB>
+                    <a:noFill/>
+                  </a:tcPr>
+                </a:tc>
+                <a:tc>
+                  <a:txBody>
+                    <a:bodyPr/>
+                    <a:lstStyle/>
+                    <a:p>
+                      <a:pPr algn="ctr" rtl="0"/>
+                      <a:r>
+                        <a:rPr lang="en-US" sz="1400" b="0" dirty="0">
+                          <a:solidFill>
+                            <a:schemeClr val="tx1">
+                              <a:alpha val="50000"/>
+                            </a:schemeClr>
+                          </a:solidFill>
+                          <a:latin typeface="David" panose="020E0502060401010101" pitchFamily="34" charset="-79"/>
+                          <a:cs typeface="David" panose="020E0502060401010101" pitchFamily="34" charset="-79"/>
+                        </a:rPr>
+                        <a:t>1</a:t>
+                      </a:r>
+                      <a:endParaRPr lang="he-IL" sz="1400" b="0" dirty="0">
+                        <a:solidFill>
+                          <a:schemeClr val="tx1">
+                            <a:alpha val="50000"/>
+                          </a:schemeClr>
+                        </a:solidFill>
+                        <a:latin typeface="David" panose="020E0502060401010101" pitchFamily="34" charset="-79"/>
+                        <a:cs typeface="David" panose="020E0502060401010101" pitchFamily="34" charset="-79"/>
+                      </a:endParaRPr>
+                    </a:p>
+                  </a:txBody>
+                  <a:tcPr marL="0" marR="0" marT="0" marB="0" anchor="ctr">
+                    <a:lnL w="12700" cap="flat" cmpd="sng" algn="ctr">
+                      <a:solidFill>
+                        <a:schemeClr val="tx1"/>
+                      </a:solidFill>
+                      <a:prstDash val="solid"/>
+                      <a:round/>
+                      <a:headEnd type="none" w="med" len="med"/>
+                      <a:tailEnd type="none" w="med" len="med"/>
+                    </a:lnL>
+                    <a:lnR w="12700" cap="flat" cmpd="sng" algn="ctr">
+                      <a:noFill/>
+                      <a:prstDash val="solid"/>
+                      <a:round/>
+                      <a:headEnd type="none" w="med" len="med"/>
+                      <a:tailEnd type="none" w="med" len="med"/>
+                    </a:lnR>
+                    <a:lnT w="12700" cap="flat" cmpd="sng" algn="ctr">
+                      <a:noFill/>
+                      <a:prstDash val="solid"/>
+                      <a:round/>
+                      <a:headEnd type="none" w="med" len="med"/>
+                      <a:tailEnd type="none" w="med" len="med"/>
+                    </a:lnT>
+                    <a:lnB w="12700" cap="flat" cmpd="sng" algn="ctr">
+                      <a:noFill/>
+                      <a:prstDash val="solid"/>
+                      <a:round/>
+                      <a:headEnd type="none" w="med" len="med"/>
+                      <a:tailEnd type="none" w="med" len="med"/>
+                    </a:lnB>
+                    <a:lnTlToBr w="12700" cmpd="sng">
+                      <a:noFill/>
+                      <a:prstDash val="solid"/>
+                    </a:lnTlToBr>
+                    <a:lnBlToTr w="12700" cmpd="sng">
+                      <a:noFill/>
+                      <a:prstDash val="solid"/>
+                    </a:lnBlToTr>
+                    <a:noFill/>
+                  </a:tcPr>
+                </a:tc>
+                <a:extLst>
+                  <a:ext uri="{0D108BD9-81ED-4DB2-BD59-A6C34878D82A}">
+                    <a16:rowId xmlns:a16="http://schemas.microsoft.com/office/drawing/2014/main" val="750551393"/>
+                  </a:ext>
+                </a:extLst>
+              </a:tr>
+              <a:tr h="219891">
+                <a:tc>
+                  <a:txBody>
+                    <a:bodyPr/>
+                    <a:lstStyle/>
+                    <a:p>
+                      <a:pPr algn="ctr" rtl="0"/>
+                      <a:r>
+                        <a:rPr lang="en-US" sz="1400" b="0" dirty="0">
+                          <a:solidFill>
+                            <a:schemeClr val="tx1"/>
+                          </a:solidFill>
+                          <a:latin typeface="David" panose="020E0502060401010101" pitchFamily="34" charset="-79"/>
+                          <a:cs typeface="David" panose="020E0502060401010101" pitchFamily="34" charset="-79"/>
+                        </a:rPr>
+                        <a:t>0</a:t>
+                      </a:r>
+                      <a:endParaRPr lang="he-IL" sz="1400" b="0" dirty="0">
+                        <a:solidFill>
+                          <a:schemeClr val="tx1"/>
+                        </a:solidFill>
+                        <a:latin typeface="David" panose="020E0502060401010101" pitchFamily="34" charset="-79"/>
+                        <a:cs typeface="David" panose="020E0502060401010101" pitchFamily="34" charset="-79"/>
+                      </a:endParaRPr>
+                    </a:p>
+                  </a:txBody>
+                  <a:tcPr marL="0" marR="0" marT="0" marB="0" anchor="ctr">
+                    <a:lnL w="12700" cap="flat" cmpd="sng" algn="ctr">
+                      <a:solidFill>
+                        <a:schemeClr val="tx1"/>
+                      </a:solidFill>
+                      <a:prstDash val="solid"/>
+                      <a:round/>
+                      <a:headEnd type="none" w="med" len="med"/>
+                      <a:tailEnd type="none" w="med" len="med"/>
+                    </a:lnL>
+                    <a:lnR w="12700" cap="flat" cmpd="sng" algn="ctr">
+                      <a:solidFill>
+                        <a:schemeClr val="tx1"/>
+                      </a:solidFill>
+                      <a:prstDash val="solid"/>
+                      <a:round/>
+                      <a:headEnd type="none" w="med" len="med"/>
+                      <a:tailEnd type="none" w="med" len="med"/>
+                    </a:lnR>
+                    <a:lnT w="12700" cap="flat" cmpd="sng" algn="ctr">
+                      <a:solidFill>
+                        <a:schemeClr val="tx1"/>
+                      </a:solidFill>
+                      <a:prstDash val="solid"/>
+                      <a:round/>
+                      <a:headEnd type="none" w="med" len="med"/>
+                      <a:tailEnd type="none" w="med" len="med"/>
+                    </a:lnT>
+                    <a:lnB w="12700" cap="flat" cmpd="sng" algn="ctr">
+                      <a:solidFill>
+                        <a:schemeClr val="tx1"/>
+                      </a:solidFill>
+                      <a:prstDash val="solid"/>
+                      <a:round/>
+                      <a:headEnd type="none" w="med" len="med"/>
+                      <a:tailEnd type="none" w="med" len="med"/>
+                    </a:lnB>
+                    <a:noFill/>
+                  </a:tcPr>
+                </a:tc>
+                <a:tc>
+                  <a:txBody>
+                    <a:bodyPr/>
+                    <a:lstStyle/>
+                    <a:p>
+                      <a:pPr algn="ctr" rtl="0"/>
+                      <a:r>
+                        <a:rPr lang="he-IL" sz="1400" b="0" dirty="0">
+                          <a:solidFill>
+                            <a:schemeClr val="tx1"/>
+                          </a:solidFill>
+                          <a:latin typeface="David" panose="020E0502060401010101" pitchFamily="34" charset="-79"/>
+                          <a:cs typeface="David" panose="020E0502060401010101" pitchFamily="34" charset="-79"/>
+                        </a:rPr>
+                        <a:t>3</a:t>
+                      </a:r>
+                    </a:p>
+                  </a:txBody>
+                  <a:tcPr marL="0" marR="0" marT="0" marB="0" anchor="ctr">
+                    <a:lnL w="12700" cap="flat" cmpd="sng" algn="ctr">
+                      <a:solidFill>
+                        <a:schemeClr val="tx1"/>
+                      </a:solidFill>
+                      <a:prstDash val="solid"/>
+                      <a:round/>
+                      <a:headEnd type="none" w="med" len="med"/>
+                      <a:tailEnd type="none" w="med" len="med"/>
+                    </a:lnL>
+                    <a:lnR w="12700" cap="flat" cmpd="sng" algn="ctr">
+                      <a:solidFill>
+                        <a:schemeClr val="tx1"/>
+                      </a:solidFill>
+                      <a:prstDash val="solid"/>
+                      <a:round/>
+                      <a:headEnd type="none" w="med" len="med"/>
+                      <a:tailEnd type="none" w="med" len="med"/>
+                    </a:lnR>
+                    <a:lnT w="12700" cap="flat" cmpd="sng" algn="ctr">
+                      <a:solidFill>
+                        <a:schemeClr val="tx1"/>
+                      </a:solidFill>
+                      <a:prstDash val="solid"/>
+                      <a:round/>
+                      <a:headEnd type="none" w="med" len="med"/>
+                      <a:tailEnd type="none" w="med" len="med"/>
+                    </a:lnT>
+                    <a:lnB w="12700" cap="flat" cmpd="sng" algn="ctr">
+                      <a:solidFill>
+                        <a:schemeClr val="tx1"/>
+                      </a:solidFill>
+                      <a:prstDash val="solid"/>
+                      <a:round/>
+                      <a:headEnd type="none" w="med" len="med"/>
+                      <a:tailEnd type="none" w="med" len="med"/>
+                    </a:lnB>
+                    <a:noFill/>
+                  </a:tcPr>
+                </a:tc>
+                <a:tc>
+                  <a:txBody>
+                    <a:bodyPr/>
+                    <a:lstStyle/>
+                    <a:p>
+                      <a:pPr algn="ctr" rtl="0"/>
+                      <a:r>
+                        <a:rPr lang="en-US" sz="1400" b="0" dirty="0">
+                          <a:solidFill>
+                            <a:schemeClr val="tx1"/>
+                          </a:solidFill>
+                          <a:latin typeface="David" panose="020E0502060401010101" pitchFamily="34" charset="-79"/>
+                          <a:cs typeface="David" panose="020E0502060401010101" pitchFamily="34" charset="-79"/>
+                        </a:rPr>
+                        <a:t>0</a:t>
+                      </a:r>
+                      <a:endParaRPr lang="he-IL" sz="1400" b="0" dirty="0">
+                        <a:solidFill>
+                          <a:schemeClr val="tx1"/>
+                        </a:solidFill>
+                        <a:latin typeface="David" panose="020E0502060401010101" pitchFamily="34" charset="-79"/>
+                        <a:cs typeface="David" panose="020E0502060401010101" pitchFamily="34" charset="-79"/>
+                      </a:endParaRPr>
+                    </a:p>
+                  </a:txBody>
+                  <a:tcPr marL="0" marR="0" marT="0" marB="0" anchor="ctr">
+                    <a:lnL w="12700" cap="flat" cmpd="sng" algn="ctr">
+                      <a:solidFill>
+                        <a:schemeClr val="tx1"/>
+                      </a:solidFill>
+                      <a:prstDash val="solid"/>
+                      <a:round/>
+                      <a:headEnd type="none" w="med" len="med"/>
+                      <a:tailEnd type="none" w="med" len="med"/>
+                    </a:lnL>
+                    <a:lnR w="12700" cap="flat" cmpd="sng" algn="ctr">
+                      <a:solidFill>
+                        <a:schemeClr val="tx1"/>
+                      </a:solidFill>
+                      <a:prstDash val="solid"/>
+                      <a:round/>
+                      <a:headEnd type="none" w="med" len="med"/>
+                      <a:tailEnd type="none" w="med" len="med"/>
+                    </a:lnR>
+                    <a:lnT w="12700" cap="flat" cmpd="sng" algn="ctr">
+                      <a:solidFill>
+                        <a:schemeClr val="tx1"/>
+                      </a:solidFill>
+                      <a:prstDash val="solid"/>
+                      <a:round/>
+                      <a:headEnd type="none" w="med" len="med"/>
+                      <a:tailEnd type="none" w="med" len="med"/>
+                    </a:lnT>
+                    <a:lnB w="12700" cap="flat" cmpd="sng" algn="ctr">
+                      <a:solidFill>
+                        <a:schemeClr val="tx1"/>
+                      </a:solidFill>
+                      <a:prstDash val="solid"/>
+                      <a:round/>
+                      <a:headEnd type="none" w="med" len="med"/>
+                      <a:tailEnd type="none" w="med" len="med"/>
+                    </a:lnB>
+                    <a:noFill/>
+                  </a:tcPr>
+                </a:tc>
+                <a:tc>
+                  <a:txBody>
+                    <a:bodyPr/>
+                    <a:lstStyle/>
+                    <a:p>
+                      <a:pPr algn="ctr" rtl="0"/>
+                      <a:r>
+                        <a:rPr lang="en-US" sz="1400" b="0" dirty="0">
+                          <a:solidFill>
+                            <a:schemeClr val="tx1">
+                              <a:alpha val="50000"/>
+                            </a:schemeClr>
+                          </a:solidFill>
+                          <a:latin typeface="David" panose="020E0502060401010101" pitchFamily="34" charset="-79"/>
+                          <a:cs typeface="David" panose="020E0502060401010101" pitchFamily="34" charset="-79"/>
+                        </a:rPr>
+                        <a:t>2</a:t>
+                      </a:r>
+                      <a:endParaRPr lang="he-IL" sz="1400" b="0" dirty="0">
+                        <a:solidFill>
+                          <a:schemeClr val="tx1">
+                            <a:alpha val="50000"/>
+                          </a:schemeClr>
+                        </a:solidFill>
+                        <a:latin typeface="David" panose="020E0502060401010101" pitchFamily="34" charset="-79"/>
+                        <a:cs typeface="David" panose="020E0502060401010101" pitchFamily="34" charset="-79"/>
+                      </a:endParaRPr>
+                    </a:p>
+                  </a:txBody>
+                  <a:tcPr marL="0" marR="0" marT="0" marB="0" anchor="ctr">
+                    <a:lnL w="12700" cap="flat" cmpd="sng" algn="ctr">
+                      <a:solidFill>
+                        <a:schemeClr val="tx1"/>
+                      </a:solidFill>
+                      <a:prstDash val="solid"/>
+                      <a:round/>
+                      <a:headEnd type="none" w="med" len="med"/>
+                      <a:tailEnd type="none" w="med" len="med"/>
+                    </a:lnL>
+                    <a:lnR w="12700" cap="flat" cmpd="sng" algn="ctr">
+                      <a:noFill/>
+                      <a:prstDash val="solid"/>
+                      <a:round/>
+                      <a:headEnd type="none" w="med" len="med"/>
+                      <a:tailEnd type="none" w="med" len="med"/>
+                    </a:lnR>
+                    <a:lnT w="12700" cap="flat" cmpd="sng" algn="ctr">
+                      <a:noFill/>
+                      <a:prstDash val="solid"/>
+                      <a:round/>
+                      <a:headEnd type="none" w="med" len="med"/>
+                      <a:tailEnd type="none" w="med" len="med"/>
+                    </a:lnT>
+                    <a:lnB w="12700" cap="flat" cmpd="sng" algn="ctr">
+                      <a:noFill/>
+                      <a:prstDash val="solid"/>
+                      <a:round/>
+                      <a:headEnd type="none" w="med" len="med"/>
+                      <a:tailEnd type="none" w="med" len="med"/>
+                    </a:lnB>
+                    <a:lnTlToBr w="12700" cmpd="sng">
+                      <a:noFill/>
+                      <a:prstDash val="solid"/>
+                    </a:lnTlToBr>
+                    <a:lnBlToTr w="12700" cmpd="sng">
+                      <a:noFill/>
+                      <a:prstDash val="solid"/>
+                    </a:lnBlToTr>
+                    <a:noFill/>
+                  </a:tcPr>
+                </a:tc>
+                <a:extLst>
+                  <a:ext uri="{0D108BD9-81ED-4DB2-BD59-A6C34878D82A}">
+                    <a16:rowId xmlns:a16="http://schemas.microsoft.com/office/drawing/2014/main" val="394282296"/>
+                  </a:ext>
+                </a:extLst>
+              </a:tr>
+            </a:tbl>
+          </a:graphicData>
+        </a:graphic>
+      </p:graphicFrame>
     </p:spTree>
     <p:extLst>
       <p:ext uri="{BB962C8B-B14F-4D97-AF65-F5344CB8AC3E}">

</xml_diff>

<commit_message>
finished first draft of 11 and 12
</commit_message>
<xml_diff>
--- a/hw1_images.pptx
+++ b/hw1_images.pptx
@@ -262,7 +262,7 @@
           <a:p>
             <a:fld id="{F9224AD2-5C0A-4A32-A676-9528AEBA74CB}" type="datetimeFigureOut">
               <a:rPr lang="he-IL" smtClean="0"/>
-              <a:t>כ"ד/כסלו/תשפ"ב</a:t>
+              <a:t>ל'/כסלו/תשפ"ב</a:t>
             </a:fld>
             <a:endParaRPr lang="he-IL"/>
           </a:p>
@@ -462,7 +462,7 @@
           <a:p>
             <a:fld id="{F9224AD2-5C0A-4A32-A676-9528AEBA74CB}" type="datetimeFigureOut">
               <a:rPr lang="he-IL" smtClean="0"/>
-              <a:t>כ"ד/כסלו/תשפ"ב</a:t>
+              <a:t>ל'/כסלו/תשפ"ב</a:t>
             </a:fld>
             <a:endParaRPr lang="he-IL"/>
           </a:p>
@@ -672,7 +672,7 @@
           <a:p>
             <a:fld id="{F9224AD2-5C0A-4A32-A676-9528AEBA74CB}" type="datetimeFigureOut">
               <a:rPr lang="he-IL" smtClean="0"/>
-              <a:t>כ"ד/כסלו/תשפ"ב</a:t>
+              <a:t>ל'/כסלו/תשפ"ב</a:t>
             </a:fld>
             <a:endParaRPr lang="he-IL"/>
           </a:p>
@@ -872,7 +872,7 @@
           <a:p>
             <a:fld id="{F9224AD2-5C0A-4A32-A676-9528AEBA74CB}" type="datetimeFigureOut">
               <a:rPr lang="he-IL" smtClean="0"/>
-              <a:t>כ"ד/כסלו/תשפ"ב</a:t>
+              <a:t>ל'/כסלו/תשפ"ב</a:t>
             </a:fld>
             <a:endParaRPr lang="he-IL"/>
           </a:p>
@@ -1148,7 +1148,7 @@
           <a:p>
             <a:fld id="{F9224AD2-5C0A-4A32-A676-9528AEBA74CB}" type="datetimeFigureOut">
               <a:rPr lang="he-IL" smtClean="0"/>
-              <a:t>כ"ד/כסלו/תשפ"ב</a:t>
+              <a:t>ל'/כסלו/תשפ"ב</a:t>
             </a:fld>
             <a:endParaRPr lang="he-IL"/>
           </a:p>
@@ -1416,7 +1416,7 @@
           <a:p>
             <a:fld id="{F9224AD2-5C0A-4A32-A676-9528AEBA74CB}" type="datetimeFigureOut">
               <a:rPr lang="he-IL" smtClean="0"/>
-              <a:t>כ"ד/כסלו/תשפ"ב</a:t>
+              <a:t>ל'/כסלו/תשפ"ב</a:t>
             </a:fld>
             <a:endParaRPr lang="he-IL"/>
           </a:p>
@@ -1831,7 +1831,7 @@
           <a:p>
             <a:fld id="{F9224AD2-5C0A-4A32-A676-9528AEBA74CB}" type="datetimeFigureOut">
               <a:rPr lang="he-IL" smtClean="0"/>
-              <a:t>כ"ד/כסלו/תשפ"ב</a:t>
+              <a:t>ל'/כסלו/תשפ"ב</a:t>
             </a:fld>
             <a:endParaRPr lang="he-IL"/>
           </a:p>
@@ -1973,7 +1973,7 @@
           <a:p>
             <a:fld id="{F9224AD2-5C0A-4A32-A676-9528AEBA74CB}" type="datetimeFigureOut">
               <a:rPr lang="he-IL" smtClean="0"/>
-              <a:t>כ"ד/כסלו/תשפ"ב</a:t>
+              <a:t>ל'/כסלו/תשפ"ב</a:t>
             </a:fld>
             <a:endParaRPr lang="he-IL"/>
           </a:p>
@@ -2086,7 +2086,7 @@
           <a:p>
             <a:fld id="{F9224AD2-5C0A-4A32-A676-9528AEBA74CB}" type="datetimeFigureOut">
               <a:rPr lang="he-IL" smtClean="0"/>
-              <a:t>כ"ד/כסלו/תשפ"ב</a:t>
+              <a:t>ל'/כסלו/תשפ"ב</a:t>
             </a:fld>
             <a:endParaRPr lang="he-IL"/>
           </a:p>
@@ -2399,7 +2399,7 @@
           <a:p>
             <a:fld id="{F9224AD2-5C0A-4A32-A676-9528AEBA74CB}" type="datetimeFigureOut">
               <a:rPr lang="he-IL" smtClean="0"/>
-              <a:t>כ"ד/כסלו/תשפ"ב</a:t>
+              <a:t>ל'/כסלו/תשפ"ב</a:t>
             </a:fld>
             <a:endParaRPr lang="he-IL"/>
           </a:p>
@@ -2688,7 +2688,7 @@
           <a:p>
             <a:fld id="{F9224AD2-5C0A-4A32-A676-9528AEBA74CB}" type="datetimeFigureOut">
               <a:rPr lang="he-IL" smtClean="0"/>
-              <a:t>כ"ד/כסלו/תשפ"ב</a:t>
+              <a:t>ל'/כסלו/תשפ"ב</a:t>
             </a:fld>
             <a:endParaRPr lang="he-IL"/>
           </a:p>
@@ -2931,7 +2931,7 @@
           <a:p>
             <a:fld id="{F9224AD2-5C0A-4A32-A676-9528AEBA74CB}" type="datetimeFigureOut">
               <a:rPr lang="he-IL" smtClean="0"/>
-              <a:t>כ"ד/כסלו/תשפ"ב</a:t>
+              <a:t>ל'/כסלו/תשפ"ב</a:t>
             </a:fld>
             <a:endParaRPr lang="he-IL"/>
           </a:p>
@@ -12867,6 +12867,622 @@
           </a:graphicData>
         </a:graphic>
       </p:graphicFrame>
+      <p:grpSp>
+        <p:nvGrpSpPr>
+          <p:cNvPr id="26" name="Group 25">
+            <a:extLst>
+              <a:ext uri="{FF2B5EF4-FFF2-40B4-BE49-F238E27FC236}">
+                <a16:creationId xmlns:a16="http://schemas.microsoft.com/office/drawing/2014/main" id="{F21175FC-ABFD-4861-9264-2DAF4811997E}"/>
+              </a:ext>
+            </a:extLst>
+          </p:cNvPr>
+          <p:cNvGrpSpPr/>
+          <p:nvPr/>
+        </p:nvGrpSpPr>
+        <p:grpSpPr>
+          <a:xfrm>
+            <a:off x="5353690" y="1201022"/>
+            <a:ext cx="3311236" cy="3661924"/>
+            <a:chOff x="5353690" y="1201022"/>
+            <a:chExt cx="3311236" cy="3661924"/>
+          </a:xfrm>
+        </p:grpSpPr>
+        <p:sp>
+          <p:nvSpPr>
+            <p:cNvPr id="2" name="Oval 1">
+              <a:extLst>
+                <a:ext uri="{FF2B5EF4-FFF2-40B4-BE49-F238E27FC236}">
+                  <a16:creationId xmlns:a16="http://schemas.microsoft.com/office/drawing/2014/main" id="{472BBC34-A31F-43B1-A664-358224BD7AA6}"/>
+                </a:ext>
+              </a:extLst>
+            </p:cNvPr>
+            <p:cNvSpPr/>
+            <p:nvPr/>
+          </p:nvSpPr>
+          <p:spPr>
+            <a:xfrm>
+              <a:off x="6623690" y="1201022"/>
+              <a:ext cx="914400" cy="914400"/>
+            </a:xfrm>
+            <a:prstGeom prst="ellipse">
+              <a:avLst/>
+            </a:prstGeom>
+          </p:spPr>
+          <p:style>
+            <a:lnRef idx="2">
+              <a:schemeClr val="accent1">
+                <a:shade val="50000"/>
+              </a:schemeClr>
+            </a:lnRef>
+            <a:fillRef idx="1">
+              <a:schemeClr val="accent1"/>
+            </a:fillRef>
+            <a:effectRef idx="0">
+              <a:schemeClr val="accent1"/>
+            </a:effectRef>
+            <a:fontRef idx="minor">
+              <a:schemeClr val="lt1"/>
+            </a:fontRef>
+          </p:style>
+          <p:txBody>
+            <a:bodyPr rtlCol="1" anchor="ctr"/>
+            <a:lstStyle/>
+            <a:p>
+              <a:pPr algn="ctr"/>
+              <a:r>
+                <a:rPr lang="en-US" sz="1400" dirty="0">
+                  <a:latin typeface="David" panose="020E0502060401010101" pitchFamily="34" charset="-79"/>
+                  <a:cs typeface="David" panose="020E0502060401010101" pitchFamily="34" charset="-79"/>
+                </a:rPr>
+                <a:t>1.</a:t>
+              </a:r>
+            </a:p>
+            <a:p>
+              <a:pPr algn="ctr"/>
+              <a:r>
+                <a:rPr lang="en-US" sz="1400" dirty="0">
+                  <a:latin typeface="David" panose="020E0502060401010101" pitchFamily="34" charset="-79"/>
+                  <a:cs typeface="David" panose="020E0502060401010101" pitchFamily="34" charset="-79"/>
+                </a:rPr>
+                <a:t>h=100</a:t>
+              </a:r>
+              <a:endParaRPr lang="he-IL" sz="1400" dirty="0">
+                <a:latin typeface="David" panose="020E0502060401010101" pitchFamily="34" charset="-79"/>
+                <a:cs typeface="David" panose="020E0502060401010101" pitchFamily="34" charset="-79"/>
+              </a:endParaRPr>
+            </a:p>
+          </p:txBody>
+        </p:sp>
+        <p:sp>
+          <p:nvSpPr>
+            <p:cNvPr id="5" name="Oval 4">
+              <a:extLst>
+                <a:ext uri="{FF2B5EF4-FFF2-40B4-BE49-F238E27FC236}">
+                  <a16:creationId xmlns:a16="http://schemas.microsoft.com/office/drawing/2014/main" id="{53E3681F-2E9B-43E2-B798-C383387ACE9A}"/>
+                </a:ext>
+              </a:extLst>
+            </p:cNvPr>
+            <p:cNvSpPr/>
+            <p:nvPr/>
+          </p:nvSpPr>
+          <p:spPr>
+            <a:xfrm>
+              <a:off x="5353690" y="2514600"/>
+              <a:ext cx="914400" cy="914400"/>
+            </a:xfrm>
+            <a:prstGeom prst="ellipse">
+              <a:avLst/>
+            </a:prstGeom>
+          </p:spPr>
+          <p:style>
+            <a:lnRef idx="2">
+              <a:schemeClr val="accent1">
+                <a:shade val="50000"/>
+              </a:schemeClr>
+            </a:lnRef>
+            <a:fillRef idx="1">
+              <a:schemeClr val="accent1"/>
+            </a:fillRef>
+            <a:effectRef idx="0">
+              <a:schemeClr val="accent1"/>
+            </a:effectRef>
+            <a:fontRef idx="minor">
+              <a:schemeClr val="lt1"/>
+            </a:fontRef>
+          </p:style>
+          <p:txBody>
+            <a:bodyPr rtlCol="1" anchor="ctr"/>
+            <a:lstStyle/>
+            <a:p>
+              <a:pPr algn="ctr"/>
+              <a:r>
+                <a:rPr lang="en-US" sz="1400" dirty="0">
+                  <a:latin typeface="David" panose="020E0502060401010101" pitchFamily="34" charset="-79"/>
+                  <a:cs typeface="David" panose="020E0502060401010101" pitchFamily="34" charset="-79"/>
+                </a:rPr>
+                <a:t>2.</a:t>
+              </a:r>
+            </a:p>
+            <a:p>
+              <a:pPr algn="ctr"/>
+              <a:r>
+                <a:rPr lang="en-US" sz="1400" dirty="0">
+                  <a:latin typeface="David" panose="020E0502060401010101" pitchFamily="34" charset="-79"/>
+                  <a:cs typeface="David" panose="020E0502060401010101" pitchFamily="34" charset="-79"/>
+                </a:rPr>
+                <a:t>h=50</a:t>
+              </a:r>
+              <a:endParaRPr lang="he-IL" sz="1400" dirty="0">
+                <a:latin typeface="David" panose="020E0502060401010101" pitchFamily="34" charset="-79"/>
+                <a:cs typeface="David" panose="020E0502060401010101" pitchFamily="34" charset="-79"/>
+              </a:endParaRPr>
+            </a:p>
+          </p:txBody>
+        </p:sp>
+        <p:sp>
+          <p:nvSpPr>
+            <p:cNvPr id="6" name="Oval 5">
+              <a:extLst>
+                <a:ext uri="{FF2B5EF4-FFF2-40B4-BE49-F238E27FC236}">
+                  <a16:creationId xmlns:a16="http://schemas.microsoft.com/office/drawing/2014/main" id="{8EE010F1-51BD-452C-9F67-CA9A6B000D80}"/>
+                </a:ext>
+              </a:extLst>
+            </p:cNvPr>
+            <p:cNvSpPr/>
+            <p:nvPr/>
+          </p:nvSpPr>
+          <p:spPr>
+            <a:xfrm>
+              <a:off x="7750526" y="2516925"/>
+              <a:ext cx="914400" cy="914400"/>
+            </a:xfrm>
+            <a:prstGeom prst="ellipse">
+              <a:avLst/>
+            </a:prstGeom>
+          </p:spPr>
+          <p:style>
+            <a:lnRef idx="2">
+              <a:schemeClr val="accent1">
+                <a:shade val="50000"/>
+              </a:schemeClr>
+            </a:lnRef>
+            <a:fillRef idx="1">
+              <a:schemeClr val="accent1"/>
+            </a:fillRef>
+            <a:effectRef idx="0">
+              <a:schemeClr val="accent1"/>
+            </a:effectRef>
+            <a:fontRef idx="minor">
+              <a:schemeClr val="lt1"/>
+            </a:fontRef>
+          </p:style>
+          <p:txBody>
+            <a:bodyPr rtlCol="1" anchor="ctr"/>
+            <a:lstStyle/>
+            <a:p>
+              <a:pPr algn="ctr"/>
+              <a:r>
+                <a:rPr lang="en-US" sz="1400" dirty="0">
+                  <a:latin typeface="David" panose="020E0502060401010101" pitchFamily="34" charset="-79"/>
+                  <a:cs typeface="David" panose="020E0502060401010101" pitchFamily="34" charset="-79"/>
+                </a:rPr>
+                <a:t>3.</a:t>
+              </a:r>
+            </a:p>
+            <a:p>
+              <a:pPr algn="ctr"/>
+              <a:r>
+                <a:rPr lang="en-US" sz="1400" dirty="0">
+                  <a:latin typeface="David" panose="020E0502060401010101" pitchFamily="34" charset="-79"/>
+                  <a:cs typeface="David" panose="020E0502060401010101" pitchFamily="34" charset="-79"/>
+                </a:rPr>
+                <a:t>h=100</a:t>
+              </a:r>
+              <a:endParaRPr lang="he-IL" sz="1400" dirty="0">
+                <a:latin typeface="David" panose="020E0502060401010101" pitchFamily="34" charset="-79"/>
+                <a:cs typeface="David" panose="020E0502060401010101" pitchFamily="34" charset="-79"/>
+              </a:endParaRPr>
+            </a:p>
+          </p:txBody>
+        </p:sp>
+        <p:sp>
+          <p:nvSpPr>
+            <p:cNvPr id="7" name="Oval 6">
+              <a:extLst>
+                <a:ext uri="{FF2B5EF4-FFF2-40B4-BE49-F238E27FC236}">
+                  <a16:creationId xmlns:a16="http://schemas.microsoft.com/office/drawing/2014/main" id="{26CB1C39-6555-4367-9FEC-99048DD87090}"/>
+                </a:ext>
+              </a:extLst>
+            </p:cNvPr>
+            <p:cNvSpPr/>
+            <p:nvPr/>
+          </p:nvSpPr>
+          <p:spPr>
+            <a:xfrm>
+              <a:off x="6445890" y="3948546"/>
+              <a:ext cx="914400" cy="914400"/>
+            </a:xfrm>
+            <a:prstGeom prst="ellipse">
+              <a:avLst/>
+            </a:prstGeom>
+          </p:spPr>
+          <p:style>
+            <a:lnRef idx="2">
+              <a:schemeClr val="accent1">
+                <a:shade val="50000"/>
+              </a:schemeClr>
+            </a:lnRef>
+            <a:fillRef idx="1">
+              <a:schemeClr val="accent1"/>
+            </a:fillRef>
+            <a:effectRef idx="0">
+              <a:schemeClr val="accent1"/>
+            </a:effectRef>
+            <a:fontRef idx="minor">
+              <a:schemeClr val="lt1"/>
+            </a:fontRef>
+          </p:style>
+          <p:txBody>
+            <a:bodyPr rtlCol="1" anchor="ctr"/>
+            <a:lstStyle/>
+            <a:p>
+              <a:pPr algn="ctr"/>
+              <a:r>
+                <a:rPr lang="en-US" sz="1400" dirty="0">
+                  <a:latin typeface="David" panose="020E0502060401010101" pitchFamily="34" charset="-79"/>
+                  <a:cs typeface="David" panose="020E0502060401010101" pitchFamily="34" charset="-79"/>
+                </a:rPr>
+                <a:t>4.</a:t>
+              </a:r>
+            </a:p>
+            <a:p>
+              <a:pPr algn="ctr"/>
+              <a:r>
+                <a:rPr lang="en-US" sz="1400" dirty="0">
+                  <a:latin typeface="David" panose="020E0502060401010101" pitchFamily="34" charset="-79"/>
+                  <a:cs typeface="David" panose="020E0502060401010101" pitchFamily="34" charset="-79"/>
+                </a:rPr>
+                <a:t>h=1</a:t>
+              </a:r>
+              <a:endParaRPr lang="he-IL" sz="1400" dirty="0">
+                <a:latin typeface="David" panose="020E0502060401010101" pitchFamily="34" charset="-79"/>
+                <a:cs typeface="David" panose="020E0502060401010101" pitchFamily="34" charset="-79"/>
+              </a:endParaRPr>
+            </a:p>
+          </p:txBody>
+        </p:sp>
+        <p:cxnSp>
+          <p:nvCxnSpPr>
+            <p:cNvPr id="9" name="Straight Arrow Connector 8">
+              <a:extLst>
+                <a:ext uri="{FF2B5EF4-FFF2-40B4-BE49-F238E27FC236}">
+                  <a16:creationId xmlns:a16="http://schemas.microsoft.com/office/drawing/2014/main" id="{F8D4EE0B-C44C-444B-9CBE-40D66C0D73F7}"/>
+                </a:ext>
+              </a:extLst>
+            </p:cNvPr>
+            <p:cNvCxnSpPr>
+              <a:stCxn id="2" idx="3"/>
+              <a:endCxn id="5" idx="7"/>
+            </p:cNvCxnSpPr>
+            <p:nvPr/>
+          </p:nvCxnSpPr>
+          <p:spPr>
+            <a:xfrm flipH="1">
+              <a:off x="6134179" y="1981511"/>
+              <a:ext cx="623422" cy="667000"/>
+            </a:xfrm>
+            <a:prstGeom prst="straightConnector1">
+              <a:avLst/>
+            </a:prstGeom>
+            <a:ln w="25400">
+              <a:tailEnd type="triangle"/>
+            </a:ln>
+          </p:spPr>
+          <p:style>
+            <a:lnRef idx="1">
+              <a:schemeClr val="accent1"/>
+            </a:lnRef>
+            <a:fillRef idx="0">
+              <a:schemeClr val="accent1"/>
+            </a:fillRef>
+            <a:effectRef idx="0">
+              <a:schemeClr val="accent1"/>
+            </a:effectRef>
+            <a:fontRef idx="minor">
+              <a:schemeClr val="tx1"/>
+            </a:fontRef>
+          </p:style>
+        </p:cxnSp>
+        <p:cxnSp>
+          <p:nvCxnSpPr>
+            <p:cNvPr id="10" name="Straight Arrow Connector 9">
+              <a:extLst>
+                <a:ext uri="{FF2B5EF4-FFF2-40B4-BE49-F238E27FC236}">
+                  <a16:creationId xmlns:a16="http://schemas.microsoft.com/office/drawing/2014/main" id="{22B49C30-9576-40CE-A2E7-32D560803EE2}"/>
+                </a:ext>
+              </a:extLst>
+            </p:cNvPr>
+            <p:cNvCxnSpPr>
+              <a:cxnSpLocks/>
+              <a:stCxn id="2" idx="5"/>
+              <a:endCxn id="6" idx="1"/>
+            </p:cNvCxnSpPr>
+            <p:nvPr/>
+          </p:nvCxnSpPr>
+          <p:spPr>
+            <a:xfrm>
+              <a:off x="7404179" y="1981511"/>
+              <a:ext cx="480258" cy="669325"/>
+            </a:xfrm>
+            <a:prstGeom prst="straightConnector1">
+              <a:avLst/>
+            </a:prstGeom>
+            <a:ln w="25400">
+              <a:tailEnd type="triangle"/>
+            </a:ln>
+          </p:spPr>
+          <p:style>
+            <a:lnRef idx="1">
+              <a:schemeClr val="accent1"/>
+            </a:lnRef>
+            <a:fillRef idx="0">
+              <a:schemeClr val="accent1"/>
+            </a:fillRef>
+            <a:effectRef idx="0">
+              <a:schemeClr val="accent1"/>
+            </a:effectRef>
+            <a:fontRef idx="minor">
+              <a:schemeClr val="tx1"/>
+            </a:fontRef>
+          </p:style>
+        </p:cxnSp>
+        <p:cxnSp>
+          <p:nvCxnSpPr>
+            <p:cNvPr id="14" name="Straight Arrow Connector 13">
+              <a:extLst>
+                <a:ext uri="{FF2B5EF4-FFF2-40B4-BE49-F238E27FC236}">
+                  <a16:creationId xmlns:a16="http://schemas.microsoft.com/office/drawing/2014/main" id="{26930FD6-F512-498D-B55C-BF07B36E8D00}"/>
+                </a:ext>
+              </a:extLst>
+            </p:cNvPr>
+            <p:cNvCxnSpPr>
+              <a:cxnSpLocks/>
+              <a:stCxn id="6" idx="3"/>
+              <a:endCxn id="7" idx="7"/>
+            </p:cNvCxnSpPr>
+            <p:nvPr/>
+          </p:nvCxnSpPr>
+          <p:spPr>
+            <a:xfrm flipH="1">
+              <a:off x="7226379" y="3297414"/>
+              <a:ext cx="658058" cy="785043"/>
+            </a:xfrm>
+            <a:prstGeom prst="straightConnector1">
+              <a:avLst/>
+            </a:prstGeom>
+            <a:ln w="25400">
+              <a:tailEnd type="triangle"/>
+            </a:ln>
+          </p:spPr>
+          <p:style>
+            <a:lnRef idx="1">
+              <a:schemeClr val="accent1"/>
+            </a:lnRef>
+            <a:fillRef idx="0">
+              <a:schemeClr val="accent1"/>
+            </a:fillRef>
+            <a:effectRef idx="0">
+              <a:schemeClr val="accent1"/>
+            </a:effectRef>
+            <a:fontRef idx="minor">
+              <a:schemeClr val="tx1"/>
+            </a:fontRef>
+          </p:style>
+        </p:cxnSp>
+        <p:cxnSp>
+          <p:nvCxnSpPr>
+            <p:cNvPr id="17" name="Straight Arrow Connector 16">
+              <a:extLst>
+                <a:ext uri="{FF2B5EF4-FFF2-40B4-BE49-F238E27FC236}">
+                  <a16:creationId xmlns:a16="http://schemas.microsoft.com/office/drawing/2014/main" id="{2DEBB072-D55B-436B-8990-EF9B215D0FDF}"/>
+                </a:ext>
+              </a:extLst>
+            </p:cNvPr>
+            <p:cNvCxnSpPr>
+              <a:cxnSpLocks/>
+              <a:stCxn id="5" idx="5"/>
+              <a:endCxn id="7" idx="1"/>
+            </p:cNvCxnSpPr>
+            <p:nvPr/>
+          </p:nvCxnSpPr>
+          <p:spPr>
+            <a:xfrm>
+              <a:off x="6134179" y="3295089"/>
+              <a:ext cx="445622" cy="787368"/>
+            </a:xfrm>
+            <a:prstGeom prst="straightConnector1">
+              <a:avLst/>
+            </a:prstGeom>
+            <a:ln w="25400">
+              <a:tailEnd type="triangle"/>
+            </a:ln>
+          </p:spPr>
+          <p:style>
+            <a:lnRef idx="1">
+              <a:schemeClr val="accent1"/>
+            </a:lnRef>
+            <a:fillRef idx="0">
+              <a:schemeClr val="accent1"/>
+            </a:fillRef>
+            <a:effectRef idx="0">
+              <a:schemeClr val="accent1"/>
+            </a:effectRef>
+            <a:fontRef idx="minor">
+              <a:schemeClr val="tx1"/>
+            </a:fontRef>
+          </p:style>
+        </p:cxnSp>
+        <p:sp>
+          <p:nvSpPr>
+            <p:cNvPr id="22" name="TextBox 21">
+              <a:extLst>
+                <a:ext uri="{FF2B5EF4-FFF2-40B4-BE49-F238E27FC236}">
+                  <a16:creationId xmlns:a16="http://schemas.microsoft.com/office/drawing/2014/main" id="{ABD8E325-25E2-410D-A0EF-0A5592A87DA5}"/>
+                </a:ext>
+              </a:extLst>
+            </p:cNvPr>
+            <p:cNvSpPr txBox="1"/>
+            <p:nvPr/>
+          </p:nvSpPr>
+          <p:spPr>
+            <a:xfrm>
+              <a:off x="6182758" y="2070750"/>
+              <a:ext cx="302458" cy="307777"/>
+            </a:xfrm>
+            <a:prstGeom prst="rect">
+              <a:avLst/>
+            </a:prstGeom>
+            <a:noFill/>
+          </p:spPr>
+          <p:txBody>
+            <a:bodyPr wrap="square" rtlCol="1">
+              <a:spAutoFit/>
+            </a:bodyPr>
+            <a:lstStyle/>
+            <a:p>
+              <a:r>
+                <a:rPr lang="en-US" sz="1400" dirty="0">
+                  <a:cs typeface="+mj-cs"/>
+                </a:rPr>
+                <a:t>1</a:t>
+              </a:r>
+              <a:endParaRPr lang="he-IL" sz="1400" dirty="0">
+                <a:cs typeface="+mj-cs"/>
+              </a:endParaRPr>
+            </a:p>
+          </p:txBody>
+        </p:sp>
+        <p:sp>
+          <p:nvSpPr>
+            <p:cNvPr id="23" name="TextBox 22">
+              <a:extLst>
+                <a:ext uri="{FF2B5EF4-FFF2-40B4-BE49-F238E27FC236}">
+                  <a16:creationId xmlns:a16="http://schemas.microsoft.com/office/drawing/2014/main" id="{B4E7A721-0785-44F3-B14A-8A08BA41FA98}"/>
+                </a:ext>
+              </a:extLst>
+            </p:cNvPr>
+            <p:cNvSpPr txBox="1"/>
+            <p:nvPr/>
+          </p:nvSpPr>
+          <p:spPr>
+            <a:xfrm>
+              <a:off x="5984118" y="3685943"/>
+              <a:ext cx="302458" cy="307777"/>
+            </a:xfrm>
+            <a:prstGeom prst="rect">
+              <a:avLst/>
+            </a:prstGeom>
+            <a:noFill/>
+          </p:spPr>
+          <p:txBody>
+            <a:bodyPr wrap="square" rtlCol="1">
+              <a:spAutoFit/>
+            </a:bodyPr>
+            <a:lstStyle/>
+            <a:p>
+              <a:r>
+                <a:rPr lang="en-US" sz="1400" dirty="0">
+                  <a:cs typeface="+mj-cs"/>
+                </a:rPr>
+                <a:t>2</a:t>
+              </a:r>
+              <a:endParaRPr lang="he-IL" sz="1400" dirty="0">
+                <a:cs typeface="+mj-cs"/>
+              </a:endParaRPr>
+            </a:p>
+          </p:txBody>
+        </p:sp>
+        <p:sp>
+          <p:nvSpPr>
+            <p:cNvPr id="24" name="TextBox 23">
+              <a:extLst>
+                <a:ext uri="{FF2B5EF4-FFF2-40B4-BE49-F238E27FC236}">
+                  <a16:creationId xmlns:a16="http://schemas.microsoft.com/office/drawing/2014/main" id="{60BDA1BF-B8C0-46C7-88D6-1D31002F3118}"/>
+                </a:ext>
+              </a:extLst>
+            </p:cNvPr>
+            <p:cNvSpPr txBox="1"/>
+            <p:nvPr/>
+          </p:nvSpPr>
+          <p:spPr>
+            <a:xfrm>
+              <a:off x="7707782" y="2046154"/>
+              <a:ext cx="523001" cy="307777"/>
+            </a:xfrm>
+            <a:prstGeom prst="rect">
+              <a:avLst/>
+            </a:prstGeom>
+            <a:noFill/>
+          </p:spPr>
+          <p:txBody>
+            <a:bodyPr wrap="square" rtlCol="1">
+              <a:spAutoFit/>
+            </a:bodyPr>
+            <a:lstStyle/>
+            <a:p>
+              <a:r>
+                <a:rPr lang="en-US" sz="1400" dirty="0">
+                  <a:cs typeface="+mj-cs"/>
+                </a:rPr>
+                <a:t>200</a:t>
+              </a:r>
+              <a:endParaRPr lang="he-IL" sz="1400" dirty="0">
+                <a:cs typeface="+mj-cs"/>
+              </a:endParaRPr>
+            </a:p>
+          </p:txBody>
+        </p:sp>
+        <p:sp>
+          <p:nvSpPr>
+            <p:cNvPr id="25" name="TextBox 24">
+              <a:extLst>
+                <a:ext uri="{FF2B5EF4-FFF2-40B4-BE49-F238E27FC236}">
+                  <a16:creationId xmlns:a16="http://schemas.microsoft.com/office/drawing/2014/main" id="{7E6E4FBF-2670-4686-BE06-A091AB654CAA}"/>
+                </a:ext>
+              </a:extLst>
+            </p:cNvPr>
+            <p:cNvSpPr txBox="1"/>
+            <p:nvPr/>
+          </p:nvSpPr>
+          <p:spPr>
+            <a:xfrm>
+              <a:off x="7555408" y="3685942"/>
+              <a:ext cx="523001" cy="307777"/>
+            </a:xfrm>
+            <a:prstGeom prst="rect">
+              <a:avLst/>
+            </a:prstGeom>
+            <a:noFill/>
+          </p:spPr>
+          <p:txBody>
+            <a:bodyPr wrap="square" rtlCol="1">
+              <a:spAutoFit/>
+            </a:bodyPr>
+            <a:lstStyle/>
+            <a:p>
+              <a:r>
+                <a:rPr lang="en-US" sz="1400" dirty="0">
+                  <a:cs typeface="+mj-cs"/>
+                </a:rPr>
+                <a:t>500</a:t>
+              </a:r>
+              <a:endParaRPr lang="he-IL" sz="1400" dirty="0">
+                <a:cs typeface="+mj-cs"/>
+              </a:endParaRPr>
+            </a:p>
+          </p:txBody>
+        </p:sp>
+      </p:grpSp>
     </p:spTree>
     <p:extLst>
       <p:ext uri="{BB962C8B-B14F-4D97-AF65-F5344CB8AC3E}">

</xml_diff>

<commit_message>
finished 16 and added a possibility for 15_5
</commit_message>
<xml_diff>
--- a/hw1_images.pptx
+++ b/hw1_images.pptx
@@ -7,6 +7,7 @@
   <p:sldIdLst>
     <p:sldId id="256" r:id="rId2"/>
     <p:sldId id="257" r:id="rId3"/>
+    <p:sldId id="259" r:id="rId4"/>
   </p:sldIdLst>
   <p:sldSz cx="12192000" cy="6858000"/>
   <p:notesSz cx="6858000" cy="9144000"/>
@@ -262,7 +263,7 @@
           <a:p>
             <a:fld id="{F9224AD2-5C0A-4A32-A676-9528AEBA74CB}" type="datetimeFigureOut">
               <a:rPr lang="he-IL" smtClean="0"/>
-              <a:t>ל'/כסלו/תשפ"ב</a:t>
+              <a:t>ז'/טבת/תשפ"ב</a:t>
             </a:fld>
             <a:endParaRPr lang="he-IL"/>
           </a:p>
@@ -462,7 +463,7 @@
           <a:p>
             <a:fld id="{F9224AD2-5C0A-4A32-A676-9528AEBA74CB}" type="datetimeFigureOut">
               <a:rPr lang="he-IL" smtClean="0"/>
-              <a:t>ל'/כסלו/תשפ"ב</a:t>
+              <a:t>ז'/טבת/תשפ"ב</a:t>
             </a:fld>
             <a:endParaRPr lang="he-IL"/>
           </a:p>
@@ -672,7 +673,7 @@
           <a:p>
             <a:fld id="{F9224AD2-5C0A-4A32-A676-9528AEBA74CB}" type="datetimeFigureOut">
               <a:rPr lang="he-IL" smtClean="0"/>
-              <a:t>ל'/כסלו/תשפ"ב</a:t>
+              <a:t>ז'/טבת/תשפ"ב</a:t>
             </a:fld>
             <a:endParaRPr lang="he-IL"/>
           </a:p>
@@ -872,7 +873,7 @@
           <a:p>
             <a:fld id="{F9224AD2-5C0A-4A32-A676-9528AEBA74CB}" type="datetimeFigureOut">
               <a:rPr lang="he-IL" smtClean="0"/>
-              <a:t>ל'/כסלו/תשפ"ב</a:t>
+              <a:t>ז'/טבת/תשפ"ב</a:t>
             </a:fld>
             <a:endParaRPr lang="he-IL"/>
           </a:p>
@@ -1148,7 +1149,7 @@
           <a:p>
             <a:fld id="{F9224AD2-5C0A-4A32-A676-9528AEBA74CB}" type="datetimeFigureOut">
               <a:rPr lang="he-IL" smtClean="0"/>
-              <a:t>ל'/כסלו/תשפ"ב</a:t>
+              <a:t>ז'/טבת/תשפ"ב</a:t>
             </a:fld>
             <a:endParaRPr lang="he-IL"/>
           </a:p>
@@ -1416,7 +1417,7 @@
           <a:p>
             <a:fld id="{F9224AD2-5C0A-4A32-A676-9528AEBA74CB}" type="datetimeFigureOut">
               <a:rPr lang="he-IL" smtClean="0"/>
-              <a:t>ל'/כסלו/תשפ"ב</a:t>
+              <a:t>ז'/טבת/תשפ"ב</a:t>
             </a:fld>
             <a:endParaRPr lang="he-IL"/>
           </a:p>
@@ -1831,7 +1832,7 @@
           <a:p>
             <a:fld id="{F9224AD2-5C0A-4A32-A676-9528AEBA74CB}" type="datetimeFigureOut">
               <a:rPr lang="he-IL" smtClean="0"/>
-              <a:t>ל'/כסלו/תשפ"ב</a:t>
+              <a:t>ז'/טבת/תשפ"ב</a:t>
             </a:fld>
             <a:endParaRPr lang="he-IL"/>
           </a:p>
@@ -1973,7 +1974,7 @@
           <a:p>
             <a:fld id="{F9224AD2-5C0A-4A32-A676-9528AEBA74CB}" type="datetimeFigureOut">
               <a:rPr lang="he-IL" smtClean="0"/>
-              <a:t>ל'/כסלו/תשפ"ב</a:t>
+              <a:t>ז'/טבת/תשפ"ב</a:t>
             </a:fld>
             <a:endParaRPr lang="he-IL"/>
           </a:p>
@@ -2086,7 +2087,7 @@
           <a:p>
             <a:fld id="{F9224AD2-5C0A-4A32-A676-9528AEBA74CB}" type="datetimeFigureOut">
               <a:rPr lang="he-IL" smtClean="0"/>
-              <a:t>ל'/כסלו/תשפ"ב</a:t>
+              <a:t>ז'/טבת/תשפ"ב</a:t>
             </a:fld>
             <a:endParaRPr lang="he-IL"/>
           </a:p>
@@ -2399,7 +2400,7 @@
           <a:p>
             <a:fld id="{F9224AD2-5C0A-4A32-A676-9528AEBA74CB}" type="datetimeFigureOut">
               <a:rPr lang="he-IL" smtClean="0"/>
-              <a:t>ל'/כסלו/תשפ"ב</a:t>
+              <a:t>ז'/טבת/תשפ"ב</a:t>
             </a:fld>
             <a:endParaRPr lang="he-IL"/>
           </a:p>
@@ -2688,7 +2689,7 @@
           <a:p>
             <a:fld id="{F9224AD2-5C0A-4A32-A676-9528AEBA74CB}" type="datetimeFigureOut">
               <a:rPr lang="he-IL" smtClean="0"/>
-              <a:t>ל'/כסלו/תשפ"ב</a:t>
+              <a:t>ז'/טבת/תשפ"ב</a:t>
             </a:fld>
             <a:endParaRPr lang="he-IL"/>
           </a:p>
@@ -2931,7 +2932,7 @@
           <a:p>
             <a:fld id="{F9224AD2-5C0A-4A32-A676-9528AEBA74CB}" type="datetimeFigureOut">
               <a:rPr lang="he-IL" smtClean="0"/>
-              <a:t>ל'/כסלו/תשפ"ב</a:t>
+              <a:t>ז'/טבת/תשפ"ב</a:t>
             </a:fld>
             <a:endParaRPr lang="he-IL"/>
           </a:p>
@@ -13496,6 +13497,681 @@
 </p:sld>
 </file>
 
+<file path=ppt/slides/slide3.xml><?xml version="1.0" encoding="utf-8"?>
+<p:sld xmlns:a="http://schemas.openxmlformats.org/drawingml/2006/main" xmlns:r="http://schemas.openxmlformats.org/officeDocument/2006/relationships" xmlns:p="http://schemas.openxmlformats.org/presentationml/2006/main">
+  <p:cSld>
+    <p:spTree>
+      <p:nvGrpSpPr>
+        <p:cNvPr id="1" name=""/>
+        <p:cNvGrpSpPr/>
+        <p:nvPr/>
+      </p:nvGrpSpPr>
+      <p:grpSpPr>
+        <a:xfrm>
+          <a:off x="0" y="0"/>
+          <a:ext cx="0" cy="0"/>
+          <a:chOff x="0" y="0"/>
+          <a:chExt cx="0" cy="0"/>
+        </a:xfrm>
+      </p:grpSpPr>
+      <p:grpSp>
+        <p:nvGrpSpPr>
+          <p:cNvPr id="20" name="Group 19">
+            <a:extLst>
+              <a:ext uri="{FF2B5EF4-FFF2-40B4-BE49-F238E27FC236}">
+                <a16:creationId xmlns:a16="http://schemas.microsoft.com/office/drawing/2014/main" id="{C0DA9A5F-3B09-4817-890F-FABF0B981834}"/>
+              </a:ext>
+            </a:extLst>
+          </p:cNvPr>
+          <p:cNvGrpSpPr/>
+          <p:nvPr/>
+        </p:nvGrpSpPr>
+        <p:grpSpPr>
+          <a:xfrm>
+            <a:off x="868680" y="653143"/>
+            <a:ext cx="10672355" cy="5551714"/>
+            <a:chOff x="868680" y="653143"/>
+            <a:chExt cx="10672355" cy="5551714"/>
+          </a:xfrm>
+        </p:grpSpPr>
+        <p:sp>
+          <p:nvSpPr>
+            <p:cNvPr id="6" name="Rectangle 5">
+              <a:extLst>
+                <a:ext uri="{FF2B5EF4-FFF2-40B4-BE49-F238E27FC236}">
+                  <a16:creationId xmlns:a16="http://schemas.microsoft.com/office/drawing/2014/main" id="{7A671C98-813C-4DAB-9DD0-5EBDD1652E6F}"/>
+                </a:ext>
+              </a:extLst>
+            </p:cNvPr>
+            <p:cNvSpPr/>
+            <p:nvPr/>
+          </p:nvSpPr>
+          <p:spPr>
+            <a:xfrm>
+              <a:off x="868680" y="653143"/>
+              <a:ext cx="8608423" cy="5551714"/>
+            </a:xfrm>
+            <a:prstGeom prst="rect">
+              <a:avLst/>
+            </a:prstGeom>
+            <a:noFill/>
+            <a:ln w="25400">
+              <a:solidFill>
+                <a:schemeClr val="tx1"/>
+              </a:solidFill>
+            </a:ln>
+          </p:spPr>
+          <p:style>
+            <a:lnRef idx="2">
+              <a:schemeClr val="accent1">
+                <a:shade val="50000"/>
+              </a:schemeClr>
+            </a:lnRef>
+            <a:fillRef idx="1">
+              <a:schemeClr val="accent1"/>
+            </a:fillRef>
+            <a:effectRef idx="0">
+              <a:schemeClr val="accent1"/>
+            </a:effectRef>
+            <a:fontRef idx="minor">
+              <a:schemeClr val="lt1"/>
+            </a:fontRef>
+          </p:style>
+          <p:txBody>
+            <a:bodyPr rtlCol="1" anchor="ctr"/>
+            <a:lstStyle/>
+            <a:p>
+              <a:pPr algn="ctr"/>
+              <a:endParaRPr lang="he-IL"/>
+            </a:p>
+          </p:txBody>
+        </p:sp>
+        <p:sp>
+          <p:nvSpPr>
+            <p:cNvPr id="7" name="Rectangle 6">
+              <a:extLst>
+                <a:ext uri="{FF2B5EF4-FFF2-40B4-BE49-F238E27FC236}">
+                  <a16:creationId xmlns:a16="http://schemas.microsoft.com/office/drawing/2014/main" id="{05754D7D-2A11-4FCF-99EB-0A4C4816007F}"/>
+                </a:ext>
+              </a:extLst>
+            </p:cNvPr>
+            <p:cNvSpPr/>
+            <p:nvPr/>
+          </p:nvSpPr>
+          <p:spPr>
+            <a:xfrm>
+              <a:off x="9714411" y="721726"/>
+              <a:ext cx="685800" cy="685800"/>
+            </a:xfrm>
+            <a:prstGeom prst="rect">
+              <a:avLst/>
+            </a:prstGeom>
+            <a:noFill/>
+            <a:ln w="25400">
+              <a:solidFill>
+                <a:schemeClr val="tx1"/>
+              </a:solidFill>
+            </a:ln>
+          </p:spPr>
+          <p:style>
+            <a:lnRef idx="2">
+              <a:schemeClr val="accent1">
+                <a:shade val="50000"/>
+              </a:schemeClr>
+            </a:lnRef>
+            <a:fillRef idx="1">
+              <a:schemeClr val="accent1"/>
+            </a:fillRef>
+            <a:effectRef idx="0">
+              <a:schemeClr val="accent1"/>
+            </a:effectRef>
+            <a:fontRef idx="minor">
+              <a:schemeClr val="lt1"/>
+            </a:fontRef>
+          </p:style>
+          <p:txBody>
+            <a:bodyPr rtlCol="1" anchor="ctr"/>
+            <a:lstStyle/>
+            <a:p>
+              <a:pPr algn="ctr"/>
+              <a:endParaRPr lang="he-IL"/>
+            </a:p>
+          </p:txBody>
+        </p:sp>
+        <p:sp>
+          <p:nvSpPr>
+            <p:cNvPr id="8" name="Rectangle 7">
+              <a:extLst>
+                <a:ext uri="{FF2B5EF4-FFF2-40B4-BE49-F238E27FC236}">
+                  <a16:creationId xmlns:a16="http://schemas.microsoft.com/office/drawing/2014/main" id="{253625CF-7C6B-481A-8097-CA46DEBCA7E3}"/>
+                </a:ext>
+              </a:extLst>
+            </p:cNvPr>
+            <p:cNvSpPr/>
+            <p:nvPr/>
+          </p:nvSpPr>
+          <p:spPr>
+            <a:xfrm rot="5400000">
+              <a:off x="8072846" y="3141618"/>
+              <a:ext cx="574765" cy="2233748"/>
+            </a:xfrm>
+            <a:prstGeom prst="rect">
+              <a:avLst/>
+            </a:prstGeom>
+            <a:solidFill>
+              <a:srgbClr val="FF0000"/>
+            </a:solidFill>
+            <a:ln>
+              <a:noFill/>
+            </a:ln>
+          </p:spPr>
+          <p:style>
+            <a:lnRef idx="2">
+              <a:schemeClr val="accent1">
+                <a:shade val="50000"/>
+              </a:schemeClr>
+            </a:lnRef>
+            <a:fillRef idx="1">
+              <a:schemeClr val="accent1"/>
+            </a:fillRef>
+            <a:effectRef idx="0">
+              <a:schemeClr val="accent1"/>
+            </a:effectRef>
+            <a:fontRef idx="minor">
+              <a:schemeClr val="lt1"/>
+            </a:fontRef>
+          </p:style>
+          <p:txBody>
+            <a:bodyPr rtlCol="1" anchor="ctr"/>
+            <a:lstStyle/>
+            <a:p>
+              <a:pPr algn="ctr"/>
+              <a:endParaRPr lang="he-IL"/>
+            </a:p>
+          </p:txBody>
+        </p:sp>
+        <p:sp>
+          <p:nvSpPr>
+            <p:cNvPr id="9" name="Rectangle 8">
+              <a:extLst>
+                <a:ext uri="{FF2B5EF4-FFF2-40B4-BE49-F238E27FC236}">
+                  <a16:creationId xmlns:a16="http://schemas.microsoft.com/office/drawing/2014/main" id="{792662BC-0F32-4A0F-ACA7-E7C374F47156}"/>
+                </a:ext>
+              </a:extLst>
+            </p:cNvPr>
+            <p:cNvSpPr/>
+            <p:nvPr/>
+          </p:nvSpPr>
+          <p:spPr>
+            <a:xfrm>
+              <a:off x="7243354" y="3971109"/>
+              <a:ext cx="574765" cy="2233748"/>
+            </a:xfrm>
+            <a:prstGeom prst="rect">
+              <a:avLst/>
+            </a:prstGeom>
+            <a:solidFill>
+              <a:srgbClr val="FF0000"/>
+            </a:solidFill>
+            <a:ln>
+              <a:noFill/>
+            </a:ln>
+          </p:spPr>
+          <p:style>
+            <a:lnRef idx="2">
+              <a:schemeClr val="accent1">
+                <a:shade val="50000"/>
+              </a:schemeClr>
+            </a:lnRef>
+            <a:fillRef idx="1">
+              <a:schemeClr val="accent1"/>
+            </a:fillRef>
+            <a:effectRef idx="0">
+              <a:schemeClr val="accent1"/>
+            </a:effectRef>
+            <a:fontRef idx="minor">
+              <a:schemeClr val="lt1"/>
+            </a:fontRef>
+          </p:style>
+          <p:txBody>
+            <a:bodyPr rtlCol="1" anchor="ctr"/>
+            <a:lstStyle/>
+            <a:p>
+              <a:pPr algn="ctr"/>
+              <a:endParaRPr lang="he-IL"/>
+            </a:p>
+          </p:txBody>
+        </p:sp>
+        <p:sp>
+          <p:nvSpPr>
+            <p:cNvPr id="10" name="Rectangle 9">
+              <a:extLst>
+                <a:ext uri="{FF2B5EF4-FFF2-40B4-BE49-F238E27FC236}">
+                  <a16:creationId xmlns:a16="http://schemas.microsoft.com/office/drawing/2014/main" id="{A357C0EB-FBC5-4F67-A444-6FBD6BA60664}"/>
+                </a:ext>
+              </a:extLst>
+            </p:cNvPr>
+            <p:cNvSpPr/>
+            <p:nvPr/>
+          </p:nvSpPr>
+          <p:spPr>
+            <a:xfrm rot="5400000">
+              <a:off x="9714411" y="1576254"/>
+              <a:ext cx="685800" cy="685800"/>
+            </a:xfrm>
+            <a:prstGeom prst="rect">
+              <a:avLst/>
+            </a:prstGeom>
+            <a:solidFill>
+              <a:srgbClr val="FF0000"/>
+            </a:solidFill>
+            <a:ln>
+              <a:noFill/>
+            </a:ln>
+          </p:spPr>
+          <p:style>
+            <a:lnRef idx="2">
+              <a:schemeClr val="accent1">
+                <a:shade val="50000"/>
+              </a:schemeClr>
+            </a:lnRef>
+            <a:fillRef idx="1">
+              <a:schemeClr val="accent1"/>
+            </a:fillRef>
+            <a:effectRef idx="0">
+              <a:schemeClr val="accent1"/>
+            </a:effectRef>
+            <a:fontRef idx="minor">
+              <a:schemeClr val="lt1"/>
+            </a:fontRef>
+          </p:style>
+          <p:txBody>
+            <a:bodyPr rtlCol="1" anchor="ctr"/>
+            <a:lstStyle/>
+            <a:p>
+              <a:pPr algn="ctr"/>
+              <a:endParaRPr lang="he-IL"/>
+            </a:p>
+          </p:txBody>
+        </p:sp>
+        <p:sp>
+          <p:nvSpPr>
+            <p:cNvPr id="11" name="Rectangle 10">
+              <a:extLst>
+                <a:ext uri="{FF2B5EF4-FFF2-40B4-BE49-F238E27FC236}">
+                  <a16:creationId xmlns:a16="http://schemas.microsoft.com/office/drawing/2014/main" id="{23439AE0-7036-45E4-92B6-E1675D3558BD}"/>
+                </a:ext>
+              </a:extLst>
+            </p:cNvPr>
+            <p:cNvSpPr/>
+            <p:nvPr/>
+          </p:nvSpPr>
+          <p:spPr>
+            <a:xfrm>
+              <a:off x="9714411" y="2430781"/>
+              <a:ext cx="685800" cy="685800"/>
+            </a:xfrm>
+            <a:prstGeom prst="rect">
+              <a:avLst/>
+            </a:prstGeom>
+            <a:solidFill>
+              <a:srgbClr val="00B050"/>
+            </a:solidFill>
+            <a:ln>
+              <a:noFill/>
+            </a:ln>
+          </p:spPr>
+          <p:style>
+            <a:lnRef idx="2">
+              <a:schemeClr val="accent1">
+                <a:shade val="50000"/>
+              </a:schemeClr>
+            </a:lnRef>
+            <a:fillRef idx="1">
+              <a:schemeClr val="accent1"/>
+            </a:fillRef>
+            <a:effectRef idx="0">
+              <a:schemeClr val="accent1"/>
+            </a:effectRef>
+            <a:fontRef idx="minor">
+              <a:schemeClr val="lt1"/>
+            </a:fontRef>
+          </p:style>
+          <p:txBody>
+            <a:bodyPr rtlCol="1" anchor="ctr"/>
+            <a:lstStyle/>
+            <a:p>
+              <a:pPr algn="ctr"/>
+              <a:endParaRPr lang="he-IL"/>
+            </a:p>
+          </p:txBody>
+        </p:sp>
+        <p:sp>
+          <p:nvSpPr>
+            <p:cNvPr id="12" name="Rectangle 11">
+              <a:extLst>
+                <a:ext uri="{FF2B5EF4-FFF2-40B4-BE49-F238E27FC236}">
+                  <a16:creationId xmlns:a16="http://schemas.microsoft.com/office/drawing/2014/main" id="{A459467F-E4F1-4732-92CB-72B059BD1EDF}"/>
+                </a:ext>
+              </a:extLst>
+            </p:cNvPr>
+            <p:cNvSpPr/>
+            <p:nvPr/>
+          </p:nvSpPr>
+          <p:spPr>
+            <a:xfrm>
+              <a:off x="8479971" y="5087983"/>
+              <a:ext cx="241663" cy="662940"/>
+            </a:xfrm>
+            <a:prstGeom prst="rect">
+              <a:avLst/>
+            </a:prstGeom>
+            <a:solidFill>
+              <a:srgbClr val="FFFF00"/>
+            </a:solidFill>
+            <a:ln>
+              <a:noFill/>
+            </a:ln>
+          </p:spPr>
+          <p:style>
+            <a:lnRef idx="2">
+              <a:schemeClr val="accent1">
+                <a:shade val="50000"/>
+              </a:schemeClr>
+            </a:lnRef>
+            <a:fillRef idx="1">
+              <a:schemeClr val="accent1"/>
+            </a:fillRef>
+            <a:effectRef idx="0">
+              <a:schemeClr val="accent1"/>
+            </a:effectRef>
+            <a:fontRef idx="minor">
+              <a:schemeClr val="lt1"/>
+            </a:fontRef>
+          </p:style>
+          <p:txBody>
+            <a:bodyPr rtlCol="1" anchor="ctr"/>
+            <a:lstStyle/>
+            <a:p>
+              <a:pPr algn="ctr"/>
+              <a:endParaRPr lang="he-IL"/>
+            </a:p>
+          </p:txBody>
+        </p:sp>
+        <p:sp>
+          <p:nvSpPr>
+            <p:cNvPr id="13" name="Rectangle 12">
+              <a:extLst>
+                <a:ext uri="{FF2B5EF4-FFF2-40B4-BE49-F238E27FC236}">
+                  <a16:creationId xmlns:a16="http://schemas.microsoft.com/office/drawing/2014/main" id="{0A20C825-45DB-4EBA-879C-8EFCEBEF7007}"/>
+                </a:ext>
+              </a:extLst>
+            </p:cNvPr>
+            <p:cNvSpPr/>
+            <p:nvPr/>
+          </p:nvSpPr>
+          <p:spPr>
+            <a:xfrm>
+              <a:off x="9714411" y="3285309"/>
+              <a:ext cx="685800" cy="685800"/>
+            </a:xfrm>
+            <a:prstGeom prst="rect">
+              <a:avLst/>
+            </a:prstGeom>
+            <a:solidFill>
+              <a:srgbClr val="FFFF00"/>
+            </a:solidFill>
+            <a:ln>
+              <a:noFill/>
+            </a:ln>
+          </p:spPr>
+          <p:style>
+            <a:lnRef idx="2">
+              <a:schemeClr val="accent1">
+                <a:shade val="50000"/>
+              </a:schemeClr>
+            </a:lnRef>
+            <a:fillRef idx="1">
+              <a:schemeClr val="accent1"/>
+            </a:fillRef>
+            <a:effectRef idx="0">
+              <a:schemeClr val="accent1"/>
+            </a:effectRef>
+            <a:fontRef idx="minor">
+              <a:schemeClr val="lt1"/>
+            </a:fontRef>
+          </p:style>
+          <p:txBody>
+            <a:bodyPr rtlCol="1" anchor="ctr"/>
+            <a:lstStyle/>
+            <a:p>
+              <a:pPr algn="ctr"/>
+              <a:endParaRPr lang="he-IL"/>
+            </a:p>
+          </p:txBody>
+        </p:sp>
+        <p:sp>
+          <p:nvSpPr>
+            <p:cNvPr id="15" name="Rectangle 14">
+              <a:extLst>
+                <a:ext uri="{FF2B5EF4-FFF2-40B4-BE49-F238E27FC236}">
+                  <a16:creationId xmlns:a16="http://schemas.microsoft.com/office/drawing/2014/main" id="{EDA9379D-4405-4A68-AA1E-3D32FDF3C2A5}"/>
+                </a:ext>
+              </a:extLst>
+            </p:cNvPr>
+            <p:cNvSpPr/>
+            <p:nvPr/>
+          </p:nvSpPr>
+          <p:spPr>
+            <a:xfrm>
+              <a:off x="1349828" y="1064626"/>
+              <a:ext cx="241663" cy="662940"/>
+            </a:xfrm>
+            <a:prstGeom prst="rect">
+              <a:avLst/>
+            </a:prstGeom>
+            <a:solidFill>
+              <a:srgbClr val="00B050"/>
+            </a:solidFill>
+            <a:ln>
+              <a:noFill/>
+            </a:ln>
+          </p:spPr>
+          <p:style>
+            <a:lnRef idx="2">
+              <a:schemeClr val="accent1">
+                <a:shade val="50000"/>
+              </a:schemeClr>
+            </a:lnRef>
+            <a:fillRef idx="1">
+              <a:schemeClr val="accent1"/>
+            </a:fillRef>
+            <a:effectRef idx="0">
+              <a:schemeClr val="accent1"/>
+            </a:effectRef>
+            <a:fontRef idx="minor">
+              <a:schemeClr val="lt1"/>
+            </a:fontRef>
+          </p:style>
+          <p:txBody>
+            <a:bodyPr rtlCol="1" anchor="ctr"/>
+            <a:lstStyle/>
+            <a:p>
+              <a:pPr algn="ctr"/>
+              <a:endParaRPr lang="he-IL"/>
+            </a:p>
+          </p:txBody>
+        </p:sp>
+        <p:sp>
+          <p:nvSpPr>
+            <p:cNvPr id="16" name="TextBox 15">
+              <a:extLst>
+                <a:ext uri="{FF2B5EF4-FFF2-40B4-BE49-F238E27FC236}">
+                  <a16:creationId xmlns:a16="http://schemas.microsoft.com/office/drawing/2014/main" id="{0370B452-08EE-4F5E-8804-DB00294538F5}"/>
+                </a:ext>
+              </a:extLst>
+            </p:cNvPr>
+            <p:cNvSpPr txBox="1"/>
+            <p:nvPr/>
+          </p:nvSpPr>
+          <p:spPr>
+            <a:xfrm>
+              <a:off x="10489475" y="879960"/>
+              <a:ext cx="1051560" cy="369332"/>
+            </a:xfrm>
+            <a:prstGeom prst="rect">
+              <a:avLst/>
+            </a:prstGeom>
+            <a:noFill/>
+          </p:spPr>
+          <p:txBody>
+            <a:bodyPr wrap="square" rtlCol="1">
+              <a:spAutoFit/>
+            </a:bodyPr>
+            <a:lstStyle/>
+            <a:p>
+              <a:pPr algn="r" rtl="1"/>
+              <a:r>
+                <a:rPr lang="he-IL" dirty="0">
+                  <a:latin typeface="David" panose="020E0502060401010101" pitchFamily="34" charset="-79"/>
+                  <a:cs typeface="David" panose="020E0502060401010101" pitchFamily="34" charset="-79"/>
+                </a:rPr>
+                <a:t>שטח ריק</a:t>
+              </a:r>
+            </a:p>
+          </p:txBody>
+        </p:sp>
+        <p:sp>
+          <p:nvSpPr>
+            <p:cNvPr id="17" name="TextBox 16">
+              <a:extLst>
+                <a:ext uri="{FF2B5EF4-FFF2-40B4-BE49-F238E27FC236}">
+                  <a16:creationId xmlns:a16="http://schemas.microsoft.com/office/drawing/2014/main" id="{84904404-ADBD-46D4-B6C4-7B5111B43E37}"/>
+                </a:ext>
+              </a:extLst>
+            </p:cNvPr>
+            <p:cNvSpPr txBox="1"/>
+            <p:nvPr/>
+          </p:nvSpPr>
+          <p:spPr>
+            <a:xfrm>
+              <a:off x="10400211" y="1646314"/>
+              <a:ext cx="1051560" cy="369332"/>
+            </a:xfrm>
+            <a:prstGeom prst="rect">
+              <a:avLst/>
+            </a:prstGeom>
+            <a:noFill/>
+          </p:spPr>
+          <p:txBody>
+            <a:bodyPr wrap="square" rtlCol="1">
+              <a:spAutoFit/>
+            </a:bodyPr>
+            <a:lstStyle/>
+            <a:p>
+              <a:pPr algn="r" rtl="1"/>
+              <a:r>
+                <a:rPr lang="he-IL" dirty="0">
+                  <a:latin typeface="David" panose="020E0502060401010101" pitchFamily="34" charset="-79"/>
+                  <a:cs typeface="David" panose="020E0502060401010101" pitchFamily="34" charset="-79"/>
+                </a:rPr>
+                <a:t>קיר</a:t>
+              </a:r>
+            </a:p>
+          </p:txBody>
+        </p:sp>
+        <p:sp>
+          <p:nvSpPr>
+            <p:cNvPr id="18" name="TextBox 17">
+              <a:extLst>
+                <a:ext uri="{FF2B5EF4-FFF2-40B4-BE49-F238E27FC236}">
+                  <a16:creationId xmlns:a16="http://schemas.microsoft.com/office/drawing/2014/main" id="{8CE2F1F0-5729-4E70-8C7E-00AE87827186}"/>
+                </a:ext>
+              </a:extLst>
+            </p:cNvPr>
+            <p:cNvSpPr txBox="1"/>
+            <p:nvPr/>
+          </p:nvSpPr>
+          <p:spPr>
+            <a:xfrm>
+              <a:off x="10400211" y="2589015"/>
+              <a:ext cx="1051560" cy="369332"/>
+            </a:xfrm>
+            <a:prstGeom prst="rect">
+              <a:avLst/>
+            </a:prstGeom>
+            <a:noFill/>
+          </p:spPr>
+          <p:txBody>
+            <a:bodyPr wrap="square" rtlCol="1">
+              <a:spAutoFit/>
+            </a:bodyPr>
+            <a:lstStyle/>
+            <a:p>
+              <a:pPr algn="r" rtl="1"/>
+              <a:r>
+                <a:rPr lang="he-IL" dirty="0">
+                  <a:latin typeface="David" panose="020E0502060401010101" pitchFamily="34" charset="-79"/>
+                  <a:cs typeface="David" panose="020E0502060401010101" pitchFamily="34" charset="-79"/>
+                </a:rPr>
+                <a:t>התחלה</a:t>
+              </a:r>
+            </a:p>
+          </p:txBody>
+        </p:sp>
+        <p:sp>
+          <p:nvSpPr>
+            <p:cNvPr id="19" name="TextBox 18">
+              <a:extLst>
+                <a:ext uri="{FF2B5EF4-FFF2-40B4-BE49-F238E27FC236}">
+                  <a16:creationId xmlns:a16="http://schemas.microsoft.com/office/drawing/2014/main" id="{6F55F582-79B8-4B2A-A17C-8B45EA57677D}"/>
+                </a:ext>
+              </a:extLst>
+            </p:cNvPr>
+            <p:cNvSpPr txBox="1"/>
+            <p:nvPr/>
+          </p:nvSpPr>
+          <p:spPr>
+            <a:xfrm>
+              <a:off x="10399122" y="3443543"/>
+              <a:ext cx="1051560" cy="369332"/>
+            </a:xfrm>
+            <a:prstGeom prst="rect">
+              <a:avLst/>
+            </a:prstGeom>
+            <a:noFill/>
+          </p:spPr>
+          <p:txBody>
+            <a:bodyPr wrap="square" rtlCol="1">
+              <a:spAutoFit/>
+            </a:bodyPr>
+            <a:lstStyle/>
+            <a:p>
+              <a:pPr algn="r" rtl="1"/>
+              <a:r>
+                <a:rPr lang="he-IL" dirty="0">
+                  <a:latin typeface="David" panose="020E0502060401010101" pitchFamily="34" charset="-79"/>
+                  <a:cs typeface="David" panose="020E0502060401010101" pitchFamily="34" charset="-79"/>
+                </a:rPr>
+                <a:t>מטרה</a:t>
+              </a:r>
+            </a:p>
+          </p:txBody>
+        </p:sp>
+      </p:grpSp>
+    </p:spTree>
+    <p:extLst>
+      <p:ext uri="{BB962C8B-B14F-4D97-AF65-F5344CB8AC3E}">
+        <p14:creationId xmlns:p14="http://schemas.microsoft.com/office/powerpoint/2010/main" val="2882703854"/>
+      </p:ext>
+    </p:extLst>
+  </p:cSld>
+  <p:clrMapOvr>
+    <a:masterClrMapping/>
+  </p:clrMapOvr>
+</p:sld>
+</file>
+
 <file path=ppt/theme/theme1.xml><?xml version="1.0" encoding="utf-8"?>
 <a:theme xmlns:a="http://schemas.openxmlformats.org/drawingml/2006/main" name="Office Theme">
   <a:themeElements>

</xml_diff>